<commit_message>
gradients:: by sergio giraldo @ 20230318T1604CET, gpg signed
</commit_message>
<xml_diff>
--- a/powerpoint/ideas10.pptx
+++ b/powerpoint/ideas10.pptx
@@ -5,14 +5,16 @@
     <p:sldMasterId id="2147483648" r:id="rId1"/>
   </p:sldMasterIdLst>
   <p:notesMasterIdLst>
-    <p:notesMasterId r:id="rId7"/>
+    <p:notesMasterId r:id="rId9"/>
   </p:notesMasterIdLst>
   <p:sldIdLst>
     <p:sldId id="257" r:id="rId2"/>
     <p:sldId id="258" r:id="rId3"/>
     <p:sldId id="260" r:id="rId4"/>
     <p:sldId id="261" r:id="rId5"/>
-    <p:sldId id="259" r:id="rId6"/>
+    <p:sldId id="262" r:id="rId6"/>
+    <p:sldId id="263" r:id="rId7"/>
+    <p:sldId id="264" r:id="rId8"/>
   </p:sldIdLst>
   <p:sldSz cx="12192000" cy="6858000"/>
   <p:notesSz cx="6858000" cy="9144000"/>
@@ -212,7 +214,7 @@
           <a:p>
             <a:fld id="{2675364B-A801-C14C-8F98-306471A1ABBA}" type="datetimeFigureOut">
               <a:rPr lang="en-NL" smtClean="0"/>
-              <a:t>16/03/2023</a:t>
+              <a:t>18/03/2023</a:t>
             </a:fld>
             <a:endParaRPr lang="en-NL"/>
           </a:p>
@@ -629,7 +631,7 @@
           <a:p>
             <a:fld id="{3C9FEDDD-9A6B-A54E-8B95-4147A8398B0A}" type="datetimeFigureOut">
               <a:rPr lang="en-NL" smtClean="0"/>
-              <a:t>16/03/2023</a:t>
+              <a:t>18/03/2023</a:t>
             </a:fld>
             <a:endParaRPr lang="en-NL"/>
           </a:p>
@@ -829,7 +831,7 @@
           <a:p>
             <a:fld id="{3C9FEDDD-9A6B-A54E-8B95-4147A8398B0A}" type="datetimeFigureOut">
               <a:rPr lang="en-NL" smtClean="0"/>
-              <a:t>16/03/2023</a:t>
+              <a:t>18/03/2023</a:t>
             </a:fld>
             <a:endParaRPr lang="en-NL"/>
           </a:p>
@@ -1039,7 +1041,7 @@
           <a:p>
             <a:fld id="{3C9FEDDD-9A6B-A54E-8B95-4147A8398B0A}" type="datetimeFigureOut">
               <a:rPr lang="en-NL" smtClean="0"/>
-              <a:t>16/03/2023</a:t>
+              <a:t>18/03/2023</a:t>
             </a:fld>
             <a:endParaRPr lang="en-NL"/>
           </a:p>
@@ -1239,7 +1241,7 @@
           <a:p>
             <a:fld id="{3C9FEDDD-9A6B-A54E-8B95-4147A8398B0A}" type="datetimeFigureOut">
               <a:rPr lang="en-NL" smtClean="0"/>
-              <a:t>16/03/2023</a:t>
+              <a:t>18/03/2023</a:t>
             </a:fld>
             <a:endParaRPr lang="en-NL"/>
           </a:p>
@@ -1515,7 +1517,7 @@
           <a:p>
             <a:fld id="{3C9FEDDD-9A6B-A54E-8B95-4147A8398B0A}" type="datetimeFigureOut">
               <a:rPr lang="en-NL" smtClean="0"/>
-              <a:t>16/03/2023</a:t>
+              <a:t>18/03/2023</a:t>
             </a:fld>
             <a:endParaRPr lang="en-NL"/>
           </a:p>
@@ -1783,7 +1785,7 @@
           <a:p>
             <a:fld id="{3C9FEDDD-9A6B-A54E-8B95-4147A8398B0A}" type="datetimeFigureOut">
               <a:rPr lang="en-NL" smtClean="0"/>
-              <a:t>16/03/2023</a:t>
+              <a:t>18/03/2023</a:t>
             </a:fld>
             <a:endParaRPr lang="en-NL"/>
           </a:p>
@@ -2198,7 +2200,7 @@
           <a:p>
             <a:fld id="{3C9FEDDD-9A6B-A54E-8B95-4147A8398B0A}" type="datetimeFigureOut">
               <a:rPr lang="en-NL" smtClean="0"/>
-              <a:t>16/03/2023</a:t>
+              <a:t>18/03/2023</a:t>
             </a:fld>
             <a:endParaRPr lang="en-NL"/>
           </a:p>
@@ -2340,7 +2342,7 @@
           <a:p>
             <a:fld id="{3C9FEDDD-9A6B-A54E-8B95-4147A8398B0A}" type="datetimeFigureOut">
               <a:rPr lang="en-NL" smtClean="0"/>
-              <a:t>16/03/2023</a:t>
+              <a:t>18/03/2023</a:t>
             </a:fld>
             <a:endParaRPr lang="en-NL"/>
           </a:p>
@@ -2453,7 +2455,7 @@
           <a:p>
             <a:fld id="{3C9FEDDD-9A6B-A54E-8B95-4147A8398B0A}" type="datetimeFigureOut">
               <a:rPr lang="en-NL" smtClean="0"/>
-              <a:t>16/03/2023</a:t>
+              <a:t>18/03/2023</a:t>
             </a:fld>
             <a:endParaRPr lang="en-NL"/>
           </a:p>
@@ -2766,7 +2768,7 @@
           <a:p>
             <a:fld id="{3C9FEDDD-9A6B-A54E-8B95-4147A8398B0A}" type="datetimeFigureOut">
               <a:rPr lang="en-NL" smtClean="0"/>
-              <a:t>16/03/2023</a:t>
+              <a:t>18/03/2023</a:t>
             </a:fld>
             <a:endParaRPr lang="en-NL"/>
           </a:p>
@@ -3055,7 +3057,7 @@
           <a:p>
             <a:fld id="{3C9FEDDD-9A6B-A54E-8B95-4147A8398B0A}" type="datetimeFigureOut">
               <a:rPr lang="en-NL" smtClean="0"/>
-              <a:t>16/03/2023</a:t>
+              <a:t>18/03/2023</a:t>
             </a:fld>
             <a:endParaRPr lang="en-NL"/>
           </a:p>
@@ -3298,7 +3300,7 @@
           <a:p>
             <a:fld id="{3C9FEDDD-9A6B-A54E-8B95-4147A8398B0A}" type="datetimeFigureOut">
               <a:rPr lang="en-NL" smtClean="0"/>
-              <a:t>16/03/2023</a:t>
+              <a:t>18/03/2023</a:t>
             </a:fld>
             <a:endParaRPr lang="en-NL"/>
           </a:p>
@@ -4654,13 +4656,13 @@
   <p:clrMapOvr>
     <a:masterClrMapping/>
   </p:clrMapOvr>
-  <mc:AlternateContent xmlns:mc="http://schemas.openxmlformats.org/markup-compatibility/2006">
-    <mc:Choice xmlns:p159="http://schemas.microsoft.com/office/powerpoint/2015/09/main" Requires="p159">
+  <mc:AlternateContent xmlns:mc="http://schemas.openxmlformats.org/markup-compatibility/2006" xmlns:p159="http://schemas.microsoft.com/office/powerpoint/2015/09/main">
+    <mc:Choice Requires="p159">
       <p:transition spd="slow" advClick="0">
         <p159:morph option="byObject"/>
       </p:transition>
     </mc:Choice>
-    <mc:Fallback>
+    <mc:Fallback xmlns="">
       <p:transition spd="slow" advClick="0">
         <p:fade/>
       </p:transition>
@@ -5662,13 +5664,13 @@
   <p:clrMapOvr>
     <a:masterClrMapping/>
   </p:clrMapOvr>
-  <mc:AlternateContent xmlns:mc="http://schemas.openxmlformats.org/markup-compatibility/2006">
-    <mc:Choice xmlns:p159="http://schemas.microsoft.com/office/powerpoint/2015/09/main" Requires="p159">
+  <mc:AlternateContent xmlns:mc="http://schemas.openxmlformats.org/markup-compatibility/2006" xmlns:p159="http://schemas.microsoft.com/office/powerpoint/2015/09/main">
+    <mc:Choice Requires="p159">
       <p:transition spd="slow" advClick="0">
         <p159:morph option="byObject"/>
       </p:transition>
     </mc:Choice>
-    <mc:Fallback>
+    <mc:Fallback xmlns="">
       <p:transition spd="slow" advClick="0">
         <p:fade/>
       </p:transition>
@@ -6712,13 +6714,13 @@
   <p:clrMapOvr>
     <a:masterClrMapping/>
   </p:clrMapOvr>
-  <mc:AlternateContent xmlns:mc="http://schemas.openxmlformats.org/markup-compatibility/2006">
-    <mc:Choice xmlns:p159="http://schemas.microsoft.com/office/powerpoint/2015/09/main" Requires="p159">
+  <mc:AlternateContent xmlns:mc="http://schemas.openxmlformats.org/markup-compatibility/2006" xmlns:p159="http://schemas.microsoft.com/office/powerpoint/2015/09/main">
+    <mc:Choice Requires="p159">
       <p:transition spd="slow">
         <p159:morph option="byObject"/>
       </p:transition>
     </mc:Choice>
-    <mc:Fallback>
+    <mc:Fallback xmlns="">
       <p:transition spd="slow">
         <p:fade/>
       </p:transition>
@@ -7762,13 +7764,13 @@
   <p:clrMapOvr>
     <a:masterClrMapping/>
   </p:clrMapOvr>
-  <mc:AlternateContent xmlns:mc="http://schemas.openxmlformats.org/markup-compatibility/2006">
-    <mc:Choice xmlns:p159="http://schemas.microsoft.com/office/powerpoint/2015/09/main" Requires="p159">
+  <mc:AlternateContent xmlns:mc="http://schemas.openxmlformats.org/markup-compatibility/2006" xmlns:p159="http://schemas.microsoft.com/office/powerpoint/2015/09/main">
+    <mc:Choice Requires="p159">
       <p:transition spd="slow">
         <p159:morph option="byObject"/>
       </p:transition>
     </mc:Choice>
-    <mc:Fallback>
+    <mc:Fallback xmlns="">
       <p:transition spd="slow">
         <p:fade/>
       </p:transition>
@@ -7778,14 +7780,12 @@
 </file>
 
 <file path=ppt/slides/slide5.xml><?xml version="1.0" encoding="utf-8"?>
-<p:sld xmlns:a="http://schemas.openxmlformats.org/drawingml/2006/main" xmlns:r="http://schemas.openxmlformats.org/officeDocument/2006/relationships" xmlns:p="http://schemas.openxmlformats.org/presentationml/2006/main" show="0">
+<p:sld xmlns:a="http://schemas.openxmlformats.org/drawingml/2006/main" xmlns:r="http://schemas.openxmlformats.org/officeDocument/2006/relationships" xmlns:p="http://schemas.openxmlformats.org/presentationml/2006/main">
   <p:cSld>
     <p:bg>
       <p:bgPr>
         <a:solidFill>
-          <a:schemeClr val="bg1">
-            <a:lumMod val="75000"/>
-          </a:schemeClr>
+          <a:schemeClr val="bg1"/>
         </a:solidFill>
         <a:effectLst/>
       </p:bgPr>
@@ -7806,10 +7806,271 @@
       </p:grpSpPr>
       <p:sp>
         <p:nvSpPr>
-          <p:cNvPr id="70" name="TextBox 69">
-            <a:extLst>
-              <a:ext uri="{FF2B5EF4-FFF2-40B4-BE49-F238E27FC236}">
-                <a16:creationId xmlns:a16="http://schemas.microsoft.com/office/drawing/2014/main" id="{6D2B1121-BA13-5D2B-280E-3F72889C380F}"/>
+          <p:cNvPr id="1031" name="Rectangle 1030">
+            <a:extLst>
+              <a:ext uri="{FF2B5EF4-FFF2-40B4-BE49-F238E27FC236}">
+                <a16:creationId xmlns:a16="http://schemas.microsoft.com/office/drawing/2014/main" id="{42A4FC2C-047E-45A5-965D-8E1E3BF09BC6}"/>
+              </a:ext>
+              <a:ext uri="{C183D7F6-B498-43B3-948B-1728B52AA6E4}">
+                <adec:decorative xmlns:adec="http://schemas.microsoft.com/office/drawing/2017/decorative" val="1"/>
+              </a:ext>
+            </a:extLst>
+          </p:cNvPr>
+          <p:cNvSpPr>
+            <a:spLocks noGrp="1" noRot="1" noChangeAspect="1" noMove="1" noResize="1" noEditPoints="1" noAdjustHandles="1" noChangeArrowheads="1" noChangeShapeType="1" noTextEdit="1"/>
+          </p:cNvSpPr>
+          <p:nvPr>
+            <p:extLst>
+              <p:ext uri="{386F3935-93C4-4BCD-93E2-E3B085C9AB24}">
+                <p16:designElem xmlns:p16="http://schemas.microsoft.com/office/powerpoint/2015/main" val="1"/>
+              </p:ext>
+            </p:extLst>
+          </p:nvPr>
+        </p:nvSpPr>
+        <p:spPr bwMode="white">
+          <a:xfrm>
+            <a:off x="1524" y="0"/>
+            <a:ext cx="12188952" cy="6858000"/>
+          </a:xfrm>
+          <a:prstGeom prst="rect">
+            <a:avLst/>
+          </a:prstGeom>
+          <a:noFill/>
+          <a:ln>
+            <a:noFill/>
+          </a:ln>
+        </p:spPr>
+        <p:style>
+          <a:lnRef idx="2">
+            <a:schemeClr val="accent1">
+              <a:shade val="50000"/>
+            </a:schemeClr>
+          </a:lnRef>
+          <a:fillRef idx="1">
+            <a:schemeClr val="accent1"/>
+          </a:fillRef>
+          <a:effectRef idx="0">
+            <a:schemeClr val="accent1"/>
+          </a:effectRef>
+          <a:fontRef idx="minor">
+            <a:schemeClr val="lt1"/>
+          </a:fontRef>
+        </p:style>
+        <p:txBody>
+          <a:bodyPr rtlCol="0" anchor="ctr"/>
+          <a:lstStyle>
+            <a:defPPr>
+              <a:defRPr lang="en-US"/>
+            </a:defPPr>
+            <a:lvl1pPr marL="0" algn="l" defTabSz="914400" rtl="0" eaLnBrk="1" latinLnBrk="0" hangingPunct="1">
+              <a:defRPr sz="1800" kern="1200">
+                <a:solidFill>
+                  <a:schemeClr val="lt1"/>
+                </a:solidFill>
+                <a:latin typeface="+mn-lt"/>
+                <a:ea typeface="+mn-ea"/>
+                <a:cs typeface="+mn-cs"/>
+              </a:defRPr>
+            </a:lvl1pPr>
+            <a:lvl2pPr marL="457200" algn="l" defTabSz="914400" rtl="0" eaLnBrk="1" latinLnBrk="0" hangingPunct="1">
+              <a:defRPr sz="1800" kern="1200">
+                <a:solidFill>
+                  <a:schemeClr val="lt1"/>
+                </a:solidFill>
+                <a:latin typeface="+mn-lt"/>
+                <a:ea typeface="+mn-ea"/>
+                <a:cs typeface="+mn-cs"/>
+              </a:defRPr>
+            </a:lvl2pPr>
+            <a:lvl3pPr marL="914400" algn="l" defTabSz="914400" rtl="0" eaLnBrk="1" latinLnBrk="0" hangingPunct="1">
+              <a:defRPr sz="1800" kern="1200">
+                <a:solidFill>
+                  <a:schemeClr val="lt1"/>
+                </a:solidFill>
+                <a:latin typeface="+mn-lt"/>
+                <a:ea typeface="+mn-ea"/>
+                <a:cs typeface="+mn-cs"/>
+              </a:defRPr>
+            </a:lvl3pPr>
+            <a:lvl4pPr marL="1371600" algn="l" defTabSz="914400" rtl="0" eaLnBrk="1" latinLnBrk="0" hangingPunct="1">
+              <a:defRPr sz="1800" kern="1200">
+                <a:solidFill>
+                  <a:schemeClr val="lt1"/>
+                </a:solidFill>
+                <a:latin typeface="+mn-lt"/>
+                <a:ea typeface="+mn-ea"/>
+                <a:cs typeface="+mn-cs"/>
+              </a:defRPr>
+            </a:lvl4pPr>
+            <a:lvl5pPr marL="1828800" algn="l" defTabSz="914400" rtl="0" eaLnBrk="1" latinLnBrk="0" hangingPunct="1">
+              <a:defRPr sz="1800" kern="1200">
+                <a:solidFill>
+                  <a:schemeClr val="lt1"/>
+                </a:solidFill>
+                <a:latin typeface="+mn-lt"/>
+                <a:ea typeface="+mn-ea"/>
+                <a:cs typeface="+mn-cs"/>
+              </a:defRPr>
+            </a:lvl5pPr>
+            <a:lvl6pPr marL="2286000" algn="l" defTabSz="914400" rtl="0" eaLnBrk="1" latinLnBrk="0" hangingPunct="1">
+              <a:defRPr sz="1800" kern="1200">
+                <a:solidFill>
+                  <a:schemeClr val="lt1"/>
+                </a:solidFill>
+                <a:latin typeface="+mn-lt"/>
+                <a:ea typeface="+mn-ea"/>
+                <a:cs typeface="+mn-cs"/>
+              </a:defRPr>
+            </a:lvl6pPr>
+            <a:lvl7pPr marL="2743200" algn="l" defTabSz="914400" rtl="0" eaLnBrk="1" latinLnBrk="0" hangingPunct="1">
+              <a:defRPr sz="1800" kern="1200">
+                <a:solidFill>
+                  <a:schemeClr val="lt1"/>
+                </a:solidFill>
+                <a:latin typeface="+mn-lt"/>
+                <a:ea typeface="+mn-ea"/>
+                <a:cs typeface="+mn-cs"/>
+              </a:defRPr>
+            </a:lvl7pPr>
+            <a:lvl8pPr marL="3200400" algn="l" defTabSz="914400" rtl="0" eaLnBrk="1" latinLnBrk="0" hangingPunct="1">
+              <a:defRPr sz="1800" kern="1200">
+                <a:solidFill>
+                  <a:schemeClr val="lt1"/>
+                </a:solidFill>
+                <a:latin typeface="+mn-lt"/>
+                <a:ea typeface="+mn-ea"/>
+                <a:cs typeface="+mn-cs"/>
+              </a:defRPr>
+            </a:lvl8pPr>
+            <a:lvl9pPr marL="3657600" algn="l" defTabSz="914400" rtl="0" eaLnBrk="1" latinLnBrk="0" hangingPunct="1">
+              <a:defRPr sz="1800" kern="1200">
+                <a:solidFill>
+                  <a:schemeClr val="lt1"/>
+                </a:solidFill>
+                <a:latin typeface="+mn-lt"/>
+                <a:ea typeface="+mn-ea"/>
+                <a:cs typeface="+mn-cs"/>
+              </a:defRPr>
+            </a:lvl9pPr>
+          </a:lstStyle>
+          <a:p>
+            <a:pPr algn="ctr"/>
+            <a:endParaRPr lang="en-US"/>
+          </a:p>
+        </p:txBody>
+      </p:sp>
+      <p:pic>
+        <p:nvPicPr>
+          <p:cNvPr id="1026" name="Picture 2" descr="Free Boat Sea photo and picture">
+            <a:extLst>
+              <a:ext uri="{FF2B5EF4-FFF2-40B4-BE49-F238E27FC236}">
+                <a16:creationId xmlns:a16="http://schemas.microsoft.com/office/drawing/2014/main" id="{8990F2FB-3B10-75EA-FCE8-BFE04F690AA1}"/>
+              </a:ext>
+            </a:extLst>
+          </p:cNvPr>
+          <p:cNvPicPr>
+            <a:picLocks noChangeAspect="1" noChangeArrowheads="1"/>
+          </p:cNvPicPr>
+          <p:nvPr/>
+        </p:nvPicPr>
+        <p:blipFill rotWithShape="1">
+          <a:blip r:embed="rId2">
+            <a:extLst>
+              <a:ext uri="{28A0092B-C50C-407E-A947-70E740481C1C}">
+                <a14:useLocalDpi xmlns:a14="http://schemas.microsoft.com/office/drawing/2010/main" val="0"/>
+              </a:ext>
+            </a:extLst>
+          </a:blip>
+          <a:srcRect b="461"/>
+          <a:stretch/>
+        </p:blipFill>
+        <p:spPr bwMode="auto">
+          <a:xfrm>
+            <a:off x="19" y="1281"/>
+            <a:ext cx="13870725" cy="7800837"/>
+          </a:xfrm>
+          <a:prstGeom prst="rect">
+            <a:avLst/>
+          </a:prstGeom>
+          <a:noFill/>
+          <a:extLst>
+            <a:ext uri="{909E8E84-426E-40DD-AFC4-6F175D3DCCD1}">
+              <a14:hiddenFill xmlns:a14="http://schemas.microsoft.com/office/drawing/2010/main">
+                <a:solidFill>
+                  <a:srgbClr val="FFFFFF"/>
+                </a:solidFill>
+              </a14:hiddenFill>
+            </a:ext>
+          </a:extLst>
+        </p:spPr>
+      </p:pic>
+      <p:sp>
+        <p:nvSpPr>
+          <p:cNvPr id="4" name="Rectangle 3">
+            <a:extLst>
+              <a:ext uri="{FF2B5EF4-FFF2-40B4-BE49-F238E27FC236}">
+                <a16:creationId xmlns:a16="http://schemas.microsoft.com/office/drawing/2014/main" id="{1CAB8540-A3B7-E201-DB31-EC3E518C9E60}"/>
+              </a:ext>
+            </a:extLst>
+          </p:cNvPr>
+          <p:cNvSpPr/>
+          <p:nvPr/>
+        </p:nvSpPr>
+        <p:spPr>
+          <a:xfrm>
+            <a:off x="0" y="0"/>
+            <a:ext cx="12190476" cy="6858000"/>
+          </a:xfrm>
+          <a:prstGeom prst="rect">
+            <a:avLst/>
+          </a:prstGeom>
+          <a:gradFill>
+            <a:gsLst>
+              <a:gs pos="0">
+                <a:srgbClr val="7D80DA">
+                  <a:alpha val="37000"/>
+                </a:srgbClr>
+              </a:gs>
+              <a:gs pos="49000">
+                <a:srgbClr val="B0A3D4">
+                  <a:alpha val="69113"/>
+                </a:srgbClr>
+              </a:gs>
+            </a:gsLst>
+            <a:lin ang="5400000" scaled="1"/>
+          </a:gradFill>
+        </p:spPr>
+        <p:style>
+          <a:lnRef idx="2">
+            <a:schemeClr val="accent1">
+              <a:shade val="50000"/>
+            </a:schemeClr>
+          </a:lnRef>
+          <a:fillRef idx="1">
+            <a:schemeClr val="accent1"/>
+          </a:fillRef>
+          <a:effectRef idx="0">
+            <a:schemeClr val="accent1"/>
+          </a:effectRef>
+          <a:fontRef idx="minor">
+            <a:schemeClr val="lt1"/>
+          </a:fontRef>
+        </p:style>
+        <p:txBody>
+          <a:bodyPr rtlCol="0" anchor="ctr"/>
+          <a:lstStyle/>
+          <a:p>
+            <a:pPr algn="ctr"/>
+            <a:endParaRPr lang="en-NL"/>
+          </a:p>
+        </p:txBody>
+      </p:sp>
+      <p:sp>
+        <p:nvSpPr>
+          <p:cNvPr id="3" name="TextBox 2">
+            <a:extLst>
+              <a:ext uri="{FF2B5EF4-FFF2-40B4-BE49-F238E27FC236}">
+                <a16:creationId xmlns:a16="http://schemas.microsoft.com/office/drawing/2014/main" id="{7188AD0F-F4DF-AD99-7C2A-9D9E00E9BA29}"/>
               </a:ext>
             </a:extLst>
           </p:cNvPr>
@@ -7818,8 +8079,8 @@
         </p:nvSpPr>
         <p:spPr>
           <a:xfrm>
-            <a:off x="5378193" y="2726650"/>
-            <a:ext cx="6368923" cy="1446550"/>
+            <a:off x="4426255" y="6271944"/>
+            <a:ext cx="3339491" cy="584775"/>
           </a:xfrm>
           <a:prstGeom prst="rect">
             <a:avLst/>
@@ -7827,1003 +8088,1078 @@
           <a:noFill/>
         </p:spPr>
         <p:txBody>
-          <a:bodyPr wrap="none" rtlCol="0">
+          <a:bodyPr wrap="square" rtlCol="0">
             <a:spAutoFit/>
           </a:bodyPr>
           <a:lstStyle/>
           <a:p>
             <a:r>
-              <a:rPr lang="en-NL" sz="8800" b="1" dirty="0">
-                <a:latin typeface="Avenir Black" panose="02000503020000020003" pitchFamily="2" charset="0"/>
+              <a:rPr lang="en-NL" sz="3200" i="1" dirty="0">
+                <a:solidFill>
+                  <a:schemeClr val="bg1"/>
+                </a:solidFill>
+                <a:latin typeface="Baloo Bhaijaan" panose="03080902040302020200" pitchFamily="66" charset="-78"/>
+                <a:cs typeface="Baloo Bhaijaan" panose="03080902040302020200" pitchFamily="66" charset="-78"/>
               </a:rPr>
-              <a:t>PARIS 2024</a:t>
+              <a:t>a foolproof plan</a:t>
             </a:r>
           </a:p>
         </p:txBody>
       </p:sp>
-      <p:grpSp>
-        <p:nvGrpSpPr>
-          <p:cNvPr id="3" name="Group 2">
-            <a:extLst>
-              <a:ext uri="{FF2B5EF4-FFF2-40B4-BE49-F238E27FC236}">
-                <a16:creationId xmlns:a16="http://schemas.microsoft.com/office/drawing/2014/main" id="{13534B9B-F64B-FFB5-6B94-AFD4C7FB7C8F}"/>
-              </a:ext>
-            </a:extLst>
-          </p:cNvPr>
-          <p:cNvGrpSpPr/>
+      <p:sp>
+        <p:nvSpPr>
+          <p:cNvPr id="2" name="TextBox 1">
+            <a:extLst>
+              <a:ext uri="{FF2B5EF4-FFF2-40B4-BE49-F238E27FC236}">
+                <a16:creationId xmlns:a16="http://schemas.microsoft.com/office/drawing/2014/main" id="{B7E2DB66-886B-14FF-791D-24842DDB9EBF}"/>
+              </a:ext>
+            </a:extLst>
+          </p:cNvPr>
+          <p:cNvSpPr txBox="1"/>
           <p:nvPr/>
-        </p:nvGrpSpPr>
-        <p:grpSpPr>
+        </p:nvSpPr>
+        <p:spPr>
           <a:xfrm>
-            <a:off x="106889" y="1184745"/>
-            <a:ext cx="4551681" cy="4551681"/>
-            <a:chOff x="106889" y="1184745"/>
-            <a:chExt cx="4551681" cy="4551681"/>
+            <a:off x="1317812" y="869795"/>
+            <a:ext cx="9556377" cy="1015663"/>
           </a:xfrm>
-        </p:grpSpPr>
-        <p:grpSp>
-          <p:nvGrpSpPr>
-            <p:cNvPr id="69" name="Group 68">
-              <a:extLst>
-                <a:ext uri="{FF2B5EF4-FFF2-40B4-BE49-F238E27FC236}">
-                  <a16:creationId xmlns:a16="http://schemas.microsoft.com/office/drawing/2014/main" id="{56D76DAC-0240-6405-FF70-1161C2E7E9A3}"/>
-                </a:ext>
-              </a:extLst>
-            </p:cNvPr>
-            <p:cNvGrpSpPr/>
-            <p:nvPr/>
-          </p:nvGrpSpPr>
-          <p:grpSpPr>
-            <a:xfrm>
-              <a:off x="106889" y="1184745"/>
-              <a:ext cx="4551681" cy="4551681"/>
-              <a:chOff x="3823866" y="1184745"/>
-              <a:chExt cx="4551681" cy="4551681"/>
-            </a:xfrm>
-          </p:grpSpPr>
-          <p:sp>
-            <p:nvSpPr>
-              <p:cNvPr id="68" name="Freeform 67">
-                <a:extLst>
-                  <a:ext uri="{FF2B5EF4-FFF2-40B4-BE49-F238E27FC236}">
-                    <a16:creationId xmlns:a16="http://schemas.microsoft.com/office/drawing/2014/main" id="{9ED72DD5-F860-44CA-9722-78684D8476CC}"/>
-                  </a:ext>
-                </a:extLst>
-              </p:cNvPr>
-              <p:cNvSpPr/>
-              <p:nvPr/>
-            </p:nvSpPr>
-            <p:spPr>
-              <a:xfrm>
-                <a:off x="6099707" y="1184745"/>
-                <a:ext cx="1970935" cy="1619422"/>
-              </a:xfrm>
-              <a:custGeom>
-                <a:avLst/>
-                <a:gdLst>
-                  <a:gd name="connsiteX0" fmla="*/ 0 w 1970935"/>
-                  <a:gd name="connsiteY0" fmla="*/ 0 h 1619422"/>
-                  <a:gd name="connsiteX1" fmla="*/ 1970935 w 1970935"/>
-                  <a:gd name="connsiteY1" fmla="*/ 1137920 h 1619422"/>
-                  <a:gd name="connsiteX2" fmla="*/ 1136950 w 1970935"/>
-                  <a:gd name="connsiteY2" fmla="*/ 1619422 h 1619422"/>
-                  <a:gd name="connsiteX3" fmla="*/ 1123910 w 1970935"/>
-                  <a:gd name="connsiteY3" fmla="*/ 1590469 h 1619422"/>
-                  <a:gd name="connsiteX4" fmla="*/ 127412 w 1970935"/>
-                  <a:gd name="connsiteY4" fmla="*/ 879737 h 1619422"/>
-                  <a:gd name="connsiteX5" fmla="*/ 0 w 1970935"/>
-                  <a:gd name="connsiteY5" fmla="*/ 872855 h 1619422"/>
-                </a:gdLst>
-                <a:ahLst/>
-                <a:cxnLst>
-                  <a:cxn ang="0">
-                    <a:pos x="connsiteX0" y="connsiteY0"/>
-                  </a:cxn>
-                  <a:cxn ang="0">
-                    <a:pos x="connsiteX1" y="connsiteY1"/>
-                  </a:cxn>
-                  <a:cxn ang="0">
-                    <a:pos x="connsiteX2" y="connsiteY2"/>
-                  </a:cxn>
-                  <a:cxn ang="0">
-                    <a:pos x="connsiteX3" y="connsiteY3"/>
-                  </a:cxn>
-                  <a:cxn ang="0">
-                    <a:pos x="connsiteX4" y="connsiteY4"/>
-                  </a:cxn>
-                  <a:cxn ang="0">
-                    <a:pos x="connsiteX5" y="connsiteY5"/>
-                  </a:cxn>
-                </a:cxnLst>
-                <a:rect l="l" t="t" r="r" b="b"/>
-                <a:pathLst>
-                  <a:path w="1970935" h="1619422">
-                    <a:moveTo>
-                      <a:pt x="0" y="0"/>
-                    </a:moveTo>
-                    <a:cubicBezTo>
-                      <a:pt x="813079" y="0"/>
-                      <a:pt x="1564396" y="433773"/>
-                      <a:pt x="1970935" y="1137920"/>
-                    </a:cubicBezTo>
-                    <a:lnTo>
-                      <a:pt x="1136950" y="1619422"/>
-                    </a:lnTo>
-                    <a:lnTo>
-                      <a:pt x="1123910" y="1590469"/>
-                    </a:lnTo>
-                    <a:cubicBezTo>
-                      <a:pt x="926492" y="1201776"/>
-                      <a:pt x="558515" y="926563"/>
-                      <a:pt x="127412" y="879737"/>
-                    </a:cubicBezTo>
-                    <a:lnTo>
-                      <a:pt x="0" y="872855"/>
-                    </a:lnTo>
-                    <a:close/>
-                  </a:path>
-                </a:pathLst>
-              </a:custGeom>
-              <a:blipFill>
-                <a:blip r:embed="rId2"/>
-                <a:stretch>
-                  <a:fillRect/>
-                </a:stretch>
-              </a:blipFill>
-            </p:spPr>
-            <p:style>
-              <a:lnRef idx="2">
-                <a:schemeClr val="lt1">
-                  <a:hueOff val="0"/>
-                  <a:satOff val="0"/>
-                  <a:lumOff val="0"/>
-                  <a:alphaOff val="0"/>
-                </a:schemeClr>
-              </a:lnRef>
-              <a:fillRef idx="1">
-                <a:schemeClr val="accent1">
-                  <a:hueOff val="0"/>
-                  <a:satOff val="0"/>
-                  <a:lumOff val="0"/>
-                  <a:alphaOff val="0"/>
-                </a:schemeClr>
-              </a:fillRef>
-              <a:effectRef idx="0">
-                <a:schemeClr val="accent1">
-                  <a:hueOff val="0"/>
-                  <a:satOff val="0"/>
-                  <a:lumOff val="0"/>
-                  <a:alphaOff val="0"/>
-                </a:schemeClr>
-              </a:effectRef>
-              <a:fontRef idx="minor">
-                <a:schemeClr val="lt1"/>
-              </a:fontRef>
-            </p:style>
-            <p:txBody>
-              <a:bodyPr spcFirstLastPara="0" vert="horz" wrap="square" lIns="2377948" tIns="541020" rIns="952839" bIns="3141980" numCol="1" spcCol="1270" anchor="ctr" anchorCtr="0">
-                <a:noAutofit/>
-              </a:bodyPr>
-              <a:lstStyle/>
-              <a:p>
-                <a:pPr marL="0" lvl="0" indent="0" algn="ctr" defTabSz="1866900">
-                  <a:lnSpc>
-                    <a:spcPct val="90000"/>
-                  </a:lnSpc>
-                  <a:spcBef>
-                    <a:spcPct val="0"/>
-                  </a:spcBef>
-                  <a:spcAft>
-                    <a:spcPct val="35000"/>
-                  </a:spcAft>
-                  <a:buNone/>
-                </a:pPr>
-                <a:endParaRPr lang="en-GB" sz="4200" kern="1200" dirty="0"/>
-              </a:p>
-            </p:txBody>
-          </p:sp>
-          <p:sp>
-            <p:nvSpPr>
-              <p:cNvPr id="67" name="Freeform 66">
-                <a:extLst>
-                  <a:ext uri="{FF2B5EF4-FFF2-40B4-BE49-F238E27FC236}">
-                    <a16:creationId xmlns:a16="http://schemas.microsoft.com/office/drawing/2014/main" id="{393B189B-ECD9-B942-C93A-B573878FE7FC}"/>
-                  </a:ext>
-                </a:extLst>
-              </p:cNvPr>
-              <p:cNvSpPr/>
-              <p:nvPr/>
-            </p:nvSpPr>
-            <p:spPr>
-              <a:xfrm>
-                <a:off x="7212202" y="2322665"/>
-                <a:ext cx="1163345" cy="2275840"/>
-              </a:xfrm>
-              <a:custGeom>
-                <a:avLst/>
-                <a:gdLst>
-                  <a:gd name="connsiteX0" fmla="*/ 858440 w 1163345"/>
-                  <a:gd name="connsiteY0" fmla="*/ 0 h 2275840"/>
-                  <a:gd name="connsiteX1" fmla="*/ 858440 w 1163345"/>
-                  <a:gd name="connsiteY1" fmla="*/ 2275840 h 2275840"/>
-                  <a:gd name="connsiteX2" fmla="*/ 0 w 1163345"/>
-                  <a:gd name="connsiteY2" fmla="*/ 1780219 h 2275840"/>
-                  <a:gd name="connsiteX3" fmla="*/ 11415 w 1163345"/>
-                  <a:gd name="connsiteY3" fmla="*/ 1760121 h 2275840"/>
-                  <a:gd name="connsiteX4" fmla="*/ 166193 w 1163345"/>
-                  <a:gd name="connsiteY4" fmla="*/ 1106335 h 2275840"/>
-                  <a:gd name="connsiteX5" fmla="*/ 65416 w 1163345"/>
-                  <a:gd name="connsiteY5" fmla="*/ 572446 h 2275840"/>
-                  <a:gd name="connsiteX6" fmla="*/ 24455 w 1163345"/>
-                  <a:gd name="connsiteY6" fmla="*/ 481502 h 2275840"/>
-                </a:gdLst>
-                <a:ahLst/>
-                <a:cxnLst>
-                  <a:cxn ang="0">
-                    <a:pos x="connsiteX0" y="connsiteY0"/>
-                  </a:cxn>
-                  <a:cxn ang="0">
-                    <a:pos x="connsiteX1" y="connsiteY1"/>
-                  </a:cxn>
-                  <a:cxn ang="0">
-                    <a:pos x="connsiteX2" y="connsiteY2"/>
-                  </a:cxn>
-                  <a:cxn ang="0">
-                    <a:pos x="connsiteX3" y="connsiteY3"/>
-                  </a:cxn>
-                  <a:cxn ang="0">
-                    <a:pos x="connsiteX4" y="connsiteY4"/>
-                  </a:cxn>
-                  <a:cxn ang="0">
-                    <a:pos x="connsiteX5" y="connsiteY5"/>
-                  </a:cxn>
-                  <a:cxn ang="0">
-                    <a:pos x="connsiteX6" y="connsiteY6"/>
-                  </a:cxn>
-                </a:cxnLst>
-                <a:rect l="l" t="t" r="r" b="b"/>
-                <a:pathLst>
-                  <a:path w="1163345" h="2275840">
-                    <a:moveTo>
-                      <a:pt x="858440" y="0"/>
-                    </a:moveTo>
-                    <a:cubicBezTo>
-                      <a:pt x="1264980" y="704147"/>
-                      <a:pt x="1264980" y="1571693"/>
-                      <a:pt x="858440" y="2275840"/>
-                    </a:cubicBezTo>
-                    <a:lnTo>
-                      <a:pt x="0" y="1780219"/>
-                    </a:lnTo>
-                    <a:lnTo>
-                      <a:pt x="11415" y="1760121"/>
-                    </a:lnTo>
-                    <a:cubicBezTo>
-                      <a:pt x="110124" y="1565775"/>
-                      <a:pt x="166193" y="1343058"/>
-                      <a:pt x="166193" y="1106335"/>
-                    </a:cubicBezTo>
-                    <a:cubicBezTo>
-                      <a:pt x="166193" y="916957"/>
-                      <a:pt x="130309" y="736542"/>
-                      <a:pt x="65416" y="572446"/>
-                    </a:cubicBezTo>
-                    <a:lnTo>
-                      <a:pt x="24455" y="481502"/>
-                    </a:lnTo>
-                    <a:close/>
-                  </a:path>
-                </a:pathLst>
-              </a:custGeom>
-              <a:blipFill>
-                <a:blip r:embed="rId3"/>
-                <a:stretch>
-                  <a:fillRect/>
-                </a:stretch>
-              </a:blipFill>
-            </p:spPr>
-            <p:style>
-              <a:lnRef idx="2">
-                <a:schemeClr val="lt1">
-                  <a:hueOff val="0"/>
-                  <a:satOff val="0"/>
-                  <a:lumOff val="0"/>
-                  <a:alphaOff val="0"/>
-                </a:schemeClr>
-              </a:lnRef>
-              <a:fillRef idx="1">
-                <a:schemeClr val="accent1">
-                  <a:hueOff val="0"/>
-                  <a:satOff val="0"/>
-                  <a:lumOff val="0"/>
-                  <a:alphaOff val="0"/>
-                </a:schemeClr>
-              </a:fillRef>
-              <a:effectRef idx="0">
-                <a:schemeClr val="accent1">
-                  <a:hueOff val="0"/>
-                  <a:satOff val="0"/>
-                  <a:lumOff val="0"/>
-                  <a:alphaOff val="0"/>
-                </a:schemeClr>
-              </a:effectRef>
-              <a:fontRef idx="minor">
-                <a:schemeClr val="lt1"/>
-              </a:fontRef>
-            </p:style>
-            <p:txBody>
-              <a:bodyPr spcFirstLastPara="0" vert="horz" wrap="square" lIns="3170344" tIns="1869863" rIns="114215" bIns="1869864" numCol="1" spcCol="1270" anchor="ctr" anchorCtr="0">
-                <a:noAutofit/>
-              </a:bodyPr>
-              <a:lstStyle/>
-              <a:p>
-                <a:pPr marL="0" lvl="0" indent="0" algn="ctr" defTabSz="1911350">
-                  <a:lnSpc>
-                    <a:spcPct val="90000"/>
-                  </a:lnSpc>
-                  <a:spcBef>
-                    <a:spcPct val="0"/>
-                  </a:spcBef>
-                  <a:spcAft>
-                    <a:spcPct val="35000"/>
-                  </a:spcAft>
-                  <a:buNone/>
-                </a:pPr>
-                <a:endParaRPr lang="en-GB" sz="4300" kern="1200" dirty="0"/>
-              </a:p>
-            </p:txBody>
-          </p:sp>
-          <p:sp>
-            <p:nvSpPr>
-              <p:cNvPr id="66" name="Freeform 65">
-                <a:extLst>
-                  <a:ext uri="{FF2B5EF4-FFF2-40B4-BE49-F238E27FC236}">
-                    <a16:creationId xmlns:a16="http://schemas.microsoft.com/office/drawing/2014/main" id="{F1315DA8-379C-8C03-B652-B564FFFC6E0B}"/>
-                  </a:ext>
-                </a:extLst>
-              </p:cNvPr>
-              <p:cNvSpPr/>
-              <p:nvPr/>
-            </p:nvSpPr>
-            <p:spPr>
-              <a:xfrm>
-                <a:off x="6099707" y="4102885"/>
-                <a:ext cx="1970935" cy="1633541"/>
-              </a:xfrm>
-              <a:custGeom>
-                <a:avLst/>
-                <a:gdLst>
-                  <a:gd name="connsiteX0" fmla="*/ 1112495 w 1970935"/>
-                  <a:gd name="connsiteY0" fmla="*/ 0 h 1633541"/>
-                  <a:gd name="connsiteX1" fmla="*/ 1970935 w 1970935"/>
-                  <a:gd name="connsiteY1" fmla="*/ 495621 h 1633541"/>
-                  <a:gd name="connsiteX2" fmla="*/ 0 w 1970935"/>
-                  <a:gd name="connsiteY2" fmla="*/ 1633541 h 1633541"/>
-                  <a:gd name="connsiteX3" fmla="*/ 0 w 1970935"/>
-                  <a:gd name="connsiteY3" fmla="*/ 697516 h 1633541"/>
-                  <a:gd name="connsiteX4" fmla="*/ 127412 w 1970935"/>
-                  <a:gd name="connsiteY4" fmla="*/ 690635 h 1633541"/>
-                  <a:gd name="connsiteX5" fmla="*/ 1059676 w 1970935"/>
-                  <a:gd name="connsiteY5" fmla="*/ 92991 h 1633541"/>
-                </a:gdLst>
-                <a:ahLst/>
-                <a:cxnLst>
-                  <a:cxn ang="0">
-                    <a:pos x="connsiteX0" y="connsiteY0"/>
-                  </a:cxn>
-                  <a:cxn ang="0">
-                    <a:pos x="connsiteX1" y="connsiteY1"/>
-                  </a:cxn>
-                  <a:cxn ang="0">
-                    <a:pos x="connsiteX2" y="connsiteY2"/>
-                  </a:cxn>
-                  <a:cxn ang="0">
-                    <a:pos x="connsiteX3" y="connsiteY3"/>
-                  </a:cxn>
-                  <a:cxn ang="0">
-                    <a:pos x="connsiteX4" y="connsiteY4"/>
-                  </a:cxn>
-                  <a:cxn ang="0">
-                    <a:pos x="connsiteX5" y="connsiteY5"/>
-                  </a:cxn>
-                </a:cxnLst>
-                <a:rect l="l" t="t" r="r" b="b"/>
-                <a:pathLst>
-                  <a:path w="1970935" h="1633541">
-                    <a:moveTo>
-                      <a:pt x="1112495" y="0"/>
-                    </a:moveTo>
-                    <a:lnTo>
-                      <a:pt x="1970935" y="495621"/>
-                    </a:lnTo>
-                    <a:cubicBezTo>
-                      <a:pt x="1564395" y="1199768"/>
-                      <a:pt x="813079" y="1633541"/>
-                      <a:pt x="0" y="1633541"/>
-                    </a:cubicBezTo>
-                    <a:lnTo>
-                      <a:pt x="0" y="697516"/>
-                    </a:lnTo>
-                    <a:lnTo>
-                      <a:pt x="127412" y="690635"/>
-                    </a:lnTo>
-                    <a:cubicBezTo>
-                      <a:pt x="515405" y="648491"/>
-                      <a:pt x="852266" y="421354"/>
-                      <a:pt x="1059676" y="92991"/>
-                    </a:cubicBezTo>
-                    <a:close/>
-                  </a:path>
-                </a:pathLst>
-              </a:custGeom>
-              <a:blipFill>
-                <a:blip r:embed="rId4"/>
-                <a:stretch>
-                  <a:fillRect/>
-                </a:stretch>
-              </a:blipFill>
-            </p:spPr>
-            <p:style>
-              <a:lnRef idx="2">
-                <a:schemeClr val="lt1">
-                  <a:hueOff val="0"/>
-                  <a:satOff val="0"/>
-                  <a:lumOff val="0"/>
-                  <a:alphaOff val="0"/>
-                </a:schemeClr>
-              </a:lnRef>
-              <a:fillRef idx="1">
-                <a:schemeClr val="accent1">
-                  <a:hueOff val="0"/>
-                  <a:satOff val="0"/>
-                  <a:lumOff val="0"/>
-                  <a:alphaOff val="0"/>
-                </a:schemeClr>
-              </a:fillRef>
-              <a:effectRef idx="0">
-                <a:schemeClr val="accent1">
-                  <a:hueOff val="0"/>
-                  <a:satOff val="0"/>
-                  <a:lumOff val="0"/>
-                  <a:alphaOff val="0"/>
-                </a:schemeClr>
-              </a:effectRef>
-              <a:fontRef idx="minor">
-                <a:schemeClr val="lt1"/>
-              </a:fontRef>
-            </p:style>
-            <p:txBody>
-              <a:bodyPr spcFirstLastPara="0" vert="horz" wrap="square" lIns="2377948" tIns="3141980" rIns="952839" bIns="541020" numCol="1" spcCol="1270" anchor="ctr" anchorCtr="0">
-                <a:noAutofit/>
-              </a:bodyPr>
-              <a:lstStyle/>
-              <a:p>
-                <a:pPr marL="0" lvl="0" indent="0" algn="ctr" defTabSz="1866900">
-                  <a:lnSpc>
-                    <a:spcPct val="90000"/>
-                  </a:lnSpc>
-                  <a:spcBef>
-                    <a:spcPct val="0"/>
-                  </a:spcBef>
-                  <a:spcAft>
-                    <a:spcPct val="35000"/>
-                  </a:spcAft>
-                  <a:buNone/>
-                </a:pPr>
-                <a:endParaRPr lang="en-GB" sz="4200" kern="1200" dirty="0"/>
-              </a:p>
-            </p:txBody>
-          </p:sp>
-          <p:sp>
-            <p:nvSpPr>
-              <p:cNvPr id="65" name="Freeform 64">
-                <a:extLst>
-                  <a:ext uri="{FF2B5EF4-FFF2-40B4-BE49-F238E27FC236}">
-                    <a16:creationId xmlns:a16="http://schemas.microsoft.com/office/drawing/2014/main" id="{5BA3ABB8-D84C-236E-34A1-446A9FEEAEEA}"/>
-                  </a:ext>
-                </a:extLst>
-              </p:cNvPr>
-              <p:cNvSpPr/>
-              <p:nvPr/>
-            </p:nvSpPr>
-            <p:spPr>
-              <a:xfrm>
-                <a:off x="4128772" y="4106107"/>
-                <a:ext cx="1970935" cy="1630318"/>
-              </a:xfrm>
-              <a:custGeom>
-                <a:avLst/>
-                <a:gdLst>
-                  <a:gd name="connsiteX0" fmla="*/ 852859 w 1970935"/>
-                  <a:gd name="connsiteY0" fmla="*/ 0 h 1630318"/>
-                  <a:gd name="connsiteX1" fmla="*/ 903848 w 1970935"/>
-                  <a:gd name="connsiteY1" fmla="*/ 89768 h 1630318"/>
-                  <a:gd name="connsiteX2" fmla="*/ 1967229 w 1970935"/>
-                  <a:gd name="connsiteY2" fmla="*/ 694493 h 1630318"/>
-                  <a:gd name="connsiteX3" fmla="*/ 1970935 w 1970935"/>
-                  <a:gd name="connsiteY3" fmla="*/ 694293 h 1630318"/>
-                  <a:gd name="connsiteX4" fmla="*/ 1970935 w 1970935"/>
-                  <a:gd name="connsiteY4" fmla="*/ 1630318 h 1630318"/>
-                  <a:gd name="connsiteX5" fmla="*/ 0 w 1970935"/>
-                  <a:gd name="connsiteY5" fmla="*/ 492398 h 1630318"/>
-                </a:gdLst>
-                <a:ahLst/>
-                <a:cxnLst>
-                  <a:cxn ang="0">
-                    <a:pos x="connsiteX0" y="connsiteY0"/>
-                  </a:cxn>
-                  <a:cxn ang="0">
-                    <a:pos x="connsiteX1" y="connsiteY1"/>
-                  </a:cxn>
-                  <a:cxn ang="0">
-                    <a:pos x="connsiteX2" y="connsiteY2"/>
-                  </a:cxn>
-                  <a:cxn ang="0">
-                    <a:pos x="connsiteX3" y="connsiteY3"/>
-                  </a:cxn>
-                  <a:cxn ang="0">
-                    <a:pos x="connsiteX4" y="connsiteY4"/>
-                  </a:cxn>
-                  <a:cxn ang="0">
-                    <a:pos x="connsiteX5" y="connsiteY5"/>
-                  </a:cxn>
-                </a:cxnLst>
-                <a:rect l="l" t="t" r="r" b="b"/>
-                <a:pathLst>
-                  <a:path w="1970935" h="1630318">
-                    <a:moveTo>
-                      <a:pt x="852859" y="0"/>
-                    </a:moveTo>
-                    <a:lnTo>
-                      <a:pt x="903848" y="89768"/>
-                    </a:lnTo>
-                    <a:cubicBezTo>
-                      <a:pt x="1134303" y="454616"/>
-                      <a:pt x="1524575" y="694493"/>
-                      <a:pt x="1967229" y="694493"/>
-                    </a:cubicBezTo>
-                    <a:lnTo>
-                      <a:pt x="1970935" y="694293"/>
-                    </a:lnTo>
-                    <a:lnTo>
-                      <a:pt x="1970935" y="1630318"/>
-                    </a:lnTo>
-                    <a:cubicBezTo>
-                      <a:pt x="1157856" y="1630318"/>
-                      <a:pt x="406539" y="1196545"/>
-                      <a:pt x="0" y="492398"/>
-                    </a:cubicBezTo>
-                    <a:close/>
-                  </a:path>
-                </a:pathLst>
-              </a:custGeom>
-              <a:blipFill>
-                <a:blip r:embed="rId5"/>
-                <a:stretch>
-                  <a:fillRect/>
-                </a:stretch>
-              </a:blipFill>
-            </p:spPr>
-            <p:style>
-              <a:lnRef idx="2">
-                <a:schemeClr val="lt1">
-                  <a:hueOff val="0"/>
-                  <a:satOff val="0"/>
-                  <a:lumOff val="0"/>
-                  <a:alphaOff val="0"/>
-                </a:schemeClr>
-              </a:lnRef>
-              <a:fillRef idx="1">
-                <a:schemeClr val="accent1">
-                  <a:hueOff val="0"/>
-                  <a:satOff val="0"/>
-                  <a:lumOff val="0"/>
-                  <a:alphaOff val="0"/>
-                </a:schemeClr>
-              </a:fillRef>
-              <a:effectRef idx="0">
-                <a:schemeClr val="accent1">
-                  <a:hueOff val="0"/>
-                  <a:satOff val="0"/>
-                  <a:lumOff val="0"/>
-                  <a:alphaOff val="0"/>
-                </a:schemeClr>
-              </a:effectRef>
-              <a:fontRef idx="minor">
-                <a:schemeClr val="lt1"/>
-              </a:fontRef>
-            </p:style>
-            <p:txBody>
-              <a:bodyPr spcFirstLastPara="0" vert="horz" wrap="square" lIns="974429" tIns="3163570" rIns="2399538" bIns="562610" numCol="1" spcCol="1270" anchor="ctr" anchorCtr="0">
-                <a:noAutofit/>
-              </a:bodyPr>
-              <a:lstStyle/>
-              <a:p>
-                <a:pPr marL="0" lvl="0" indent="0" algn="ctr" defTabSz="2622550">
-                  <a:lnSpc>
-                    <a:spcPct val="90000"/>
-                  </a:lnSpc>
-                  <a:spcBef>
-                    <a:spcPct val="0"/>
-                  </a:spcBef>
-                  <a:spcAft>
-                    <a:spcPct val="35000"/>
-                  </a:spcAft>
-                  <a:buNone/>
-                </a:pPr>
-                <a:endParaRPr lang="en-GB" sz="5900" kern="1200" dirty="0"/>
-              </a:p>
-            </p:txBody>
-          </p:sp>
-          <p:sp>
-            <p:nvSpPr>
-              <p:cNvPr id="64" name="Freeform 63">
-                <a:extLst>
-                  <a:ext uri="{FF2B5EF4-FFF2-40B4-BE49-F238E27FC236}">
-                    <a16:creationId xmlns:a16="http://schemas.microsoft.com/office/drawing/2014/main" id="{EBEC654D-416F-EEC8-B865-6B56DD5C25ED}"/>
-                  </a:ext>
-                </a:extLst>
-              </p:cNvPr>
-              <p:cNvSpPr/>
-              <p:nvPr/>
-            </p:nvSpPr>
-            <p:spPr>
-              <a:xfrm>
-                <a:off x="3823866" y="2322665"/>
-                <a:ext cx="1157764" cy="2275840"/>
-              </a:xfrm>
-              <a:custGeom>
-                <a:avLst/>
-                <a:gdLst>
-                  <a:gd name="connsiteX0" fmla="*/ 304905 w 1157764"/>
-                  <a:gd name="connsiteY0" fmla="*/ 0 h 2275840"/>
-                  <a:gd name="connsiteX1" fmla="*/ 1133008 w 1157764"/>
-                  <a:gd name="connsiteY1" fmla="*/ 478105 h 2275840"/>
-                  <a:gd name="connsiteX2" fmla="*/ 1090517 w 1157764"/>
-                  <a:gd name="connsiteY2" fmla="*/ 572446 h 2275840"/>
-                  <a:gd name="connsiteX3" fmla="*/ 989740 w 1157764"/>
-                  <a:gd name="connsiteY3" fmla="*/ 1106335 h 2275840"/>
-                  <a:gd name="connsiteX4" fmla="*/ 1144518 w 1157764"/>
-                  <a:gd name="connsiteY4" fmla="*/ 1760121 h 2275840"/>
-                  <a:gd name="connsiteX5" fmla="*/ 1157764 w 1157764"/>
-                  <a:gd name="connsiteY5" fmla="*/ 1783442 h 2275840"/>
-                  <a:gd name="connsiteX6" fmla="*/ 304905 w 1157764"/>
-                  <a:gd name="connsiteY6" fmla="*/ 2275840 h 2275840"/>
-                  <a:gd name="connsiteX7" fmla="*/ 304905 w 1157764"/>
-                  <a:gd name="connsiteY7" fmla="*/ 0 h 2275840"/>
-                </a:gdLst>
-                <a:ahLst/>
-                <a:cxnLst>
-                  <a:cxn ang="0">
-                    <a:pos x="connsiteX0" y="connsiteY0"/>
-                  </a:cxn>
-                  <a:cxn ang="0">
-                    <a:pos x="connsiteX1" y="connsiteY1"/>
-                  </a:cxn>
-                  <a:cxn ang="0">
-                    <a:pos x="connsiteX2" y="connsiteY2"/>
-                  </a:cxn>
-                  <a:cxn ang="0">
-                    <a:pos x="connsiteX3" y="connsiteY3"/>
-                  </a:cxn>
-                  <a:cxn ang="0">
-                    <a:pos x="connsiteX4" y="connsiteY4"/>
-                  </a:cxn>
-                  <a:cxn ang="0">
-                    <a:pos x="connsiteX5" y="connsiteY5"/>
-                  </a:cxn>
-                  <a:cxn ang="0">
-                    <a:pos x="connsiteX6" y="connsiteY6"/>
-                  </a:cxn>
-                  <a:cxn ang="0">
-                    <a:pos x="connsiteX7" y="connsiteY7"/>
-                  </a:cxn>
-                </a:cxnLst>
-                <a:rect l="l" t="t" r="r" b="b"/>
-                <a:pathLst>
-                  <a:path w="1157764" h="2275840">
-                    <a:moveTo>
-                      <a:pt x="304905" y="0"/>
-                    </a:moveTo>
-                    <a:lnTo>
-                      <a:pt x="1133008" y="478105"/>
-                    </a:lnTo>
-                    <a:lnTo>
-                      <a:pt x="1090517" y="572446"/>
-                    </a:lnTo>
-                    <a:cubicBezTo>
-                      <a:pt x="1025624" y="736542"/>
-                      <a:pt x="989740" y="916957"/>
-                      <a:pt x="989740" y="1106335"/>
-                    </a:cubicBezTo>
-                    <a:cubicBezTo>
-                      <a:pt x="989740" y="1343058"/>
-                      <a:pt x="1045809" y="1565775"/>
-                      <a:pt x="1144518" y="1760121"/>
-                    </a:cubicBezTo>
-                    <a:lnTo>
-                      <a:pt x="1157764" y="1783442"/>
-                    </a:lnTo>
-                    <a:lnTo>
-                      <a:pt x="304905" y="2275840"/>
-                    </a:lnTo>
-                    <a:cubicBezTo>
-                      <a:pt x="-101635" y="1571693"/>
-                      <a:pt x="-101635" y="704147"/>
-                      <a:pt x="304905" y="0"/>
-                    </a:cubicBezTo>
-                    <a:close/>
-                  </a:path>
-                </a:pathLst>
-              </a:custGeom>
-              <a:blipFill>
-                <a:blip r:embed="rId6"/>
-                <a:stretch>
-                  <a:fillRect/>
-                </a:stretch>
-              </a:blipFill>
-            </p:spPr>
-            <p:style>
-              <a:lnRef idx="2">
-                <a:schemeClr val="lt1">
-                  <a:hueOff val="0"/>
-                  <a:satOff val="0"/>
-                  <a:lumOff val="0"/>
-                  <a:alphaOff val="0"/>
-                </a:schemeClr>
-              </a:lnRef>
-              <a:fillRef idx="1">
-                <a:schemeClr val="accent1">
-                  <a:hueOff val="0"/>
-                  <a:satOff val="0"/>
-                  <a:lumOff val="0"/>
-                  <a:alphaOff val="0"/>
-                </a:schemeClr>
-              </a:fillRef>
-              <a:effectRef idx="0">
-                <a:schemeClr val="accent1">
-                  <a:hueOff val="0"/>
-                  <a:satOff val="0"/>
-                  <a:lumOff val="0"/>
-                  <a:alphaOff val="0"/>
-                </a:schemeClr>
-              </a:effectRef>
-              <a:fontRef idx="minor">
-                <a:schemeClr val="lt1"/>
-              </a:fontRef>
-            </p:style>
-            <p:txBody>
-              <a:bodyPr spcFirstLastPara="0" vert="horz" wrap="square" lIns="140293" tIns="1885103" rIns="3174746" bIns="1885104" numCol="1" spcCol="1270" anchor="ctr" anchorCtr="0">
-                <a:noAutofit/>
-              </a:bodyPr>
-              <a:lstStyle/>
-              <a:p>
-                <a:pPr marL="0" lvl="0" indent="0" algn="ctr" defTabSz="2444750">
-                  <a:lnSpc>
-                    <a:spcPct val="90000"/>
-                  </a:lnSpc>
-                  <a:spcBef>
-                    <a:spcPct val="0"/>
-                  </a:spcBef>
-                  <a:spcAft>
-                    <a:spcPct val="35000"/>
-                  </a:spcAft>
-                  <a:buNone/>
-                </a:pPr>
-                <a:endParaRPr lang="en-GB" sz="5500" kern="1200" dirty="0"/>
-              </a:p>
-            </p:txBody>
-          </p:sp>
-          <p:sp>
-            <p:nvSpPr>
-              <p:cNvPr id="63" name="Freeform 62">
-                <a:extLst>
-                  <a:ext uri="{FF2B5EF4-FFF2-40B4-BE49-F238E27FC236}">
-                    <a16:creationId xmlns:a16="http://schemas.microsoft.com/office/drawing/2014/main" id="{136FD977-F44F-1291-49B2-E9F1A6049D56}"/>
-                  </a:ext>
-                </a:extLst>
-              </p:cNvPr>
-              <p:cNvSpPr/>
-              <p:nvPr/>
-            </p:nvSpPr>
-            <p:spPr>
-              <a:xfrm>
-                <a:off x="4128772" y="1184746"/>
-                <a:ext cx="1970935" cy="1616025"/>
-              </a:xfrm>
-              <a:custGeom>
-                <a:avLst/>
-                <a:gdLst>
-                  <a:gd name="connsiteX0" fmla="*/ 1970935 w 1970935"/>
-                  <a:gd name="connsiteY0" fmla="*/ 0 h 1616025"/>
-                  <a:gd name="connsiteX1" fmla="*/ 1970935 w 1970935"/>
-                  <a:gd name="connsiteY1" fmla="*/ 872855 h 1616025"/>
-                  <a:gd name="connsiteX2" fmla="*/ 1967229 w 1970935"/>
-                  <a:gd name="connsiteY2" fmla="*/ 872655 h 1616025"/>
-                  <a:gd name="connsiteX3" fmla="*/ 839613 w 1970935"/>
-                  <a:gd name="connsiteY3" fmla="*/ 1590469 h 1616025"/>
-                  <a:gd name="connsiteX4" fmla="*/ 828103 w 1970935"/>
-                  <a:gd name="connsiteY4" fmla="*/ 1616025 h 1616025"/>
-                  <a:gd name="connsiteX5" fmla="*/ 0 w 1970935"/>
-                  <a:gd name="connsiteY5" fmla="*/ 1137920 h 1616025"/>
-                  <a:gd name="connsiteX6" fmla="*/ 1970935 w 1970935"/>
-                  <a:gd name="connsiteY6" fmla="*/ 0 h 1616025"/>
-                </a:gdLst>
-                <a:ahLst/>
-                <a:cxnLst>
-                  <a:cxn ang="0">
-                    <a:pos x="connsiteX0" y="connsiteY0"/>
-                  </a:cxn>
-                  <a:cxn ang="0">
-                    <a:pos x="connsiteX1" y="connsiteY1"/>
-                  </a:cxn>
-                  <a:cxn ang="0">
-                    <a:pos x="connsiteX2" y="connsiteY2"/>
-                  </a:cxn>
-                  <a:cxn ang="0">
-                    <a:pos x="connsiteX3" y="connsiteY3"/>
-                  </a:cxn>
-                  <a:cxn ang="0">
-                    <a:pos x="connsiteX4" y="connsiteY4"/>
-                  </a:cxn>
-                  <a:cxn ang="0">
-                    <a:pos x="connsiteX5" y="connsiteY5"/>
-                  </a:cxn>
-                  <a:cxn ang="0">
-                    <a:pos x="connsiteX6" y="connsiteY6"/>
-                  </a:cxn>
-                </a:cxnLst>
-                <a:rect l="l" t="t" r="r" b="b"/>
-                <a:pathLst>
-                  <a:path w="1970935" h="1616025">
-                    <a:moveTo>
-                      <a:pt x="1970935" y="0"/>
-                    </a:moveTo>
-                    <a:lnTo>
-                      <a:pt x="1970935" y="872855"/>
-                    </a:lnTo>
-                    <a:lnTo>
-                      <a:pt x="1967229" y="872655"/>
-                    </a:lnTo>
-                    <a:cubicBezTo>
-                      <a:pt x="1480309" y="872655"/>
-                      <a:pt x="1056773" y="1162907"/>
-                      <a:pt x="839613" y="1590469"/>
-                    </a:cubicBezTo>
-                    <a:lnTo>
-                      <a:pt x="828103" y="1616025"/>
-                    </a:lnTo>
-                    <a:lnTo>
-                      <a:pt x="0" y="1137920"/>
-                    </a:lnTo>
-                    <a:cubicBezTo>
-                      <a:pt x="406540" y="433773"/>
-                      <a:pt x="1157856" y="0"/>
-                      <a:pt x="1970935" y="0"/>
-                    </a:cubicBezTo>
-                    <a:close/>
-                  </a:path>
-                </a:pathLst>
-              </a:custGeom>
-              <a:blipFill>
-                <a:blip r:embed="rId7"/>
-                <a:stretch>
-                  <a:fillRect/>
-                </a:stretch>
-              </a:blipFill>
-            </p:spPr>
-            <p:style>
-              <a:lnRef idx="2">
-                <a:schemeClr val="lt1">
-                  <a:hueOff val="0"/>
-                  <a:satOff val="0"/>
-                  <a:lumOff val="0"/>
-                  <a:alphaOff val="0"/>
-                </a:schemeClr>
-              </a:lnRef>
-              <a:fillRef idx="1">
-                <a:schemeClr val="accent1">
-                  <a:hueOff val="0"/>
-                  <a:satOff val="0"/>
-                  <a:lumOff val="0"/>
-                  <a:alphaOff val="0"/>
-                </a:schemeClr>
-              </a:fillRef>
-              <a:effectRef idx="0">
-                <a:schemeClr val="accent1">
-                  <a:hueOff val="0"/>
-                  <a:satOff val="0"/>
-                  <a:lumOff val="0"/>
-                  <a:alphaOff val="0"/>
-                </a:schemeClr>
-              </a:effectRef>
-              <a:fontRef idx="minor">
-                <a:schemeClr val="lt1"/>
-              </a:fontRef>
-            </p:style>
-            <p:txBody>
-              <a:bodyPr spcFirstLastPara="0" vert="horz" wrap="square" lIns="974429" tIns="562610" rIns="2399538" bIns="3163570" numCol="1" spcCol="1270" anchor="ctr" anchorCtr="0">
-                <a:noAutofit/>
-              </a:bodyPr>
-              <a:lstStyle/>
-              <a:p>
-                <a:pPr marL="0" lvl="0" indent="0" algn="ctr" defTabSz="2622550">
-                  <a:lnSpc>
-                    <a:spcPct val="90000"/>
-                  </a:lnSpc>
-                  <a:spcBef>
-                    <a:spcPct val="0"/>
-                  </a:spcBef>
-                  <a:spcAft>
-                    <a:spcPct val="35000"/>
-                  </a:spcAft>
-                  <a:buNone/>
-                </a:pPr>
-                <a:endParaRPr lang="en-GB" sz="5900" kern="1200" dirty="0"/>
-              </a:p>
-            </p:txBody>
-          </p:sp>
-        </p:grpSp>
-        <p:sp>
-          <p:nvSpPr>
-            <p:cNvPr id="2" name="TextBox 1">
-              <a:extLst>
-                <a:ext uri="{FF2B5EF4-FFF2-40B4-BE49-F238E27FC236}">
-                  <a16:creationId xmlns:a16="http://schemas.microsoft.com/office/drawing/2014/main" id="{4705D0C8-F3C2-3BBC-3123-52A3CD65A452}"/>
-                </a:ext>
-              </a:extLst>
-            </p:cNvPr>
-            <p:cNvSpPr txBox="1"/>
-            <p:nvPr/>
-          </p:nvSpPr>
-          <p:spPr>
-            <a:xfrm>
-              <a:off x="1505020" y="3157538"/>
-              <a:ext cx="1749838" cy="584775"/>
-            </a:xfrm>
-            <a:prstGeom prst="rect">
-              <a:avLst/>
-            </a:prstGeom>
-            <a:noFill/>
-          </p:spPr>
-          <p:txBody>
-            <a:bodyPr wrap="none" rtlCol="0">
-              <a:spAutoFit/>
-            </a:bodyPr>
-            <a:lstStyle/>
-            <a:p>
-              <a:r>
-                <a:rPr lang="en-NL" sz="3200" b="1" dirty="0">
-                  <a:latin typeface="Avenir Black" panose="02000503020000020003" pitchFamily="2" charset="0"/>
-                </a:rPr>
-                <a:t>SPORTS</a:t>
-              </a:r>
-            </a:p>
-          </p:txBody>
-        </p:sp>
-      </p:grpSp>
+          <a:prstGeom prst="rect">
+            <a:avLst/>
+          </a:prstGeom>
+          <a:noFill/>
+        </p:spPr>
+        <p:txBody>
+          <a:bodyPr wrap="square" rtlCol="0">
+            <a:spAutoFit/>
+          </a:bodyPr>
+          <a:lstStyle/>
+          <a:p>
+            <a:r>
+              <a:rPr lang="en-NL" sz="6000" dirty="0">
+                <a:solidFill>
+                  <a:schemeClr val="bg1"/>
+                </a:solidFill>
+                <a:latin typeface="Baloo Bhaijaan" panose="03080902040302020200" pitchFamily="66" charset="-78"/>
+                <a:cs typeface="Baloo Bhaijaan" panose="03080902040302020200" pitchFamily="66" charset="-78"/>
+              </a:rPr>
+              <a:t>PREPARE FOR RETIREMENT</a:t>
+            </a:r>
+          </a:p>
+        </p:txBody>
+      </p:sp>
     </p:spTree>
     <p:extLst>
       <p:ext uri="{BB962C8B-B14F-4D97-AF65-F5344CB8AC3E}">
-        <p14:creationId xmlns:p14="http://schemas.microsoft.com/office/powerpoint/2010/main" val="4238631245"/>
+        <p14:creationId xmlns:p14="http://schemas.microsoft.com/office/powerpoint/2010/main" val="1215801925"/>
       </p:ext>
     </p:extLst>
   </p:cSld>
   <p:clrMapOvr>
     <a:masterClrMapping/>
   </p:clrMapOvr>
-  <mc:AlternateContent xmlns:mc="http://schemas.openxmlformats.org/markup-compatibility/2006">
-    <mc:Choice xmlns:p159="http://schemas.microsoft.com/office/powerpoint/2015/09/main" Requires="p159">
-      <p:transition xmlns:p14="http://schemas.microsoft.com/office/powerpoint/2010/main" spd="slow" p14:dur="2000" advClick="0">
-        <p159:morph option="byObject"/>
-      </p:transition>
-    </mc:Choice>
-    <mc:Fallback>
-      <p:transition spd="slow" advClick="0">
-        <p:fade/>
-      </p:transition>
-    </mc:Fallback>
-  </mc:AlternateContent>
+</p:sld>
+</file>
+
+<file path=ppt/slides/slide6.xml><?xml version="1.0" encoding="utf-8"?>
+<p:sld xmlns:a="http://schemas.openxmlformats.org/drawingml/2006/main" xmlns:r="http://schemas.openxmlformats.org/officeDocument/2006/relationships" xmlns:p="http://schemas.openxmlformats.org/presentationml/2006/main">
+  <p:cSld>
+    <p:bg>
+      <p:bgPr>
+        <a:solidFill>
+          <a:schemeClr val="bg1"/>
+        </a:solidFill>
+        <a:effectLst/>
+      </p:bgPr>
+    </p:bg>
+    <p:spTree>
+      <p:nvGrpSpPr>
+        <p:cNvPr id="1" name=""/>
+        <p:cNvGrpSpPr/>
+        <p:nvPr/>
+      </p:nvGrpSpPr>
+      <p:grpSpPr>
+        <a:xfrm>
+          <a:off x="0" y="0"/>
+          <a:ext cx="0" cy="0"/>
+          <a:chOff x="0" y="0"/>
+          <a:chExt cx="0" cy="0"/>
+        </a:xfrm>
+      </p:grpSpPr>
+      <p:sp>
+        <p:nvSpPr>
+          <p:cNvPr id="2055" name="Rectangle 2054">
+            <a:extLst>
+              <a:ext uri="{FF2B5EF4-FFF2-40B4-BE49-F238E27FC236}">
+                <a16:creationId xmlns:a16="http://schemas.microsoft.com/office/drawing/2014/main" id="{42A4FC2C-047E-45A5-965D-8E1E3BF09BC6}"/>
+              </a:ext>
+              <a:ext uri="{C183D7F6-B498-43B3-948B-1728B52AA6E4}">
+                <adec:decorative xmlns:adec="http://schemas.microsoft.com/office/drawing/2017/decorative" val="1"/>
+              </a:ext>
+            </a:extLst>
+          </p:cNvPr>
+          <p:cNvSpPr>
+            <a:spLocks noGrp="1" noRot="1" noChangeAspect="1" noMove="1" noResize="1" noEditPoints="1" noAdjustHandles="1" noChangeArrowheads="1" noChangeShapeType="1" noTextEdit="1"/>
+          </p:cNvSpPr>
+          <p:nvPr>
+            <p:extLst>
+              <p:ext uri="{386F3935-93C4-4BCD-93E2-E3B085C9AB24}">
+                <p16:designElem xmlns:p16="http://schemas.microsoft.com/office/powerpoint/2015/main" val="1"/>
+              </p:ext>
+            </p:extLst>
+          </p:nvPr>
+        </p:nvSpPr>
+        <p:spPr bwMode="white">
+          <a:xfrm>
+            <a:off x="1524" y="0"/>
+            <a:ext cx="12188952" cy="6858000"/>
+          </a:xfrm>
+          <a:prstGeom prst="rect">
+            <a:avLst/>
+          </a:prstGeom>
+          <a:noFill/>
+          <a:ln>
+            <a:noFill/>
+          </a:ln>
+        </p:spPr>
+        <p:style>
+          <a:lnRef idx="2">
+            <a:schemeClr val="accent1">
+              <a:shade val="50000"/>
+            </a:schemeClr>
+          </a:lnRef>
+          <a:fillRef idx="1">
+            <a:schemeClr val="accent1"/>
+          </a:fillRef>
+          <a:effectRef idx="0">
+            <a:schemeClr val="accent1"/>
+          </a:effectRef>
+          <a:fontRef idx="minor">
+            <a:schemeClr val="lt1"/>
+          </a:fontRef>
+        </p:style>
+        <p:txBody>
+          <a:bodyPr rtlCol="0" anchor="ctr"/>
+          <a:lstStyle>
+            <a:defPPr>
+              <a:defRPr lang="en-US"/>
+            </a:defPPr>
+            <a:lvl1pPr marL="0" algn="l" defTabSz="914400" rtl="0" eaLnBrk="1" latinLnBrk="0" hangingPunct="1">
+              <a:defRPr sz="1800" kern="1200">
+                <a:solidFill>
+                  <a:schemeClr val="lt1"/>
+                </a:solidFill>
+                <a:latin typeface="+mn-lt"/>
+                <a:ea typeface="+mn-ea"/>
+                <a:cs typeface="+mn-cs"/>
+              </a:defRPr>
+            </a:lvl1pPr>
+            <a:lvl2pPr marL="457200" algn="l" defTabSz="914400" rtl="0" eaLnBrk="1" latinLnBrk="0" hangingPunct="1">
+              <a:defRPr sz="1800" kern="1200">
+                <a:solidFill>
+                  <a:schemeClr val="lt1"/>
+                </a:solidFill>
+                <a:latin typeface="+mn-lt"/>
+                <a:ea typeface="+mn-ea"/>
+                <a:cs typeface="+mn-cs"/>
+              </a:defRPr>
+            </a:lvl2pPr>
+            <a:lvl3pPr marL="914400" algn="l" defTabSz="914400" rtl="0" eaLnBrk="1" latinLnBrk="0" hangingPunct="1">
+              <a:defRPr sz="1800" kern="1200">
+                <a:solidFill>
+                  <a:schemeClr val="lt1"/>
+                </a:solidFill>
+                <a:latin typeface="+mn-lt"/>
+                <a:ea typeface="+mn-ea"/>
+                <a:cs typeface="+mn-cs"/>
+              </a:defRPr>
+            </a:lvl3pPr>
+            <a:lvl4pPr marL="1371600" algn="l" defTabSz="914400" rtl="0" eaLnBrk="1" latinLnBrk="0" hangingPunct="1">
+              <a:defRPr sz="1800" kern="1200">
+                <a:solidFill>
+                  <a:schemeClr val="lt1"/>
+                </a:solidFill>
+                <a:latin typeface="+mn-lt"/>
+                <a:ea typeface="+mn-ea"/>
+                <a:cs typeface="+mn-cs"/>
+              </a:defRPr>
+            </a:lvl4pPr>
+            <a:lvl5pPr marL="1828800" algn="l" defTabSz="914400" rtl="0" eaLnBrk="1" latinLnBrk="0" hangingPunct="1">
+              <a:defRPr sz="1800" kern="1200">
+                <a:solidFill>
+                  <a:schemeClr val="lt1"/>
+                </a:solidFill>
+                <a:latin typeface="+mn-lt"/>
+                <a:ea typeface="+mn-ea"/>
+                <a:cs typeface="+mn-cs"/>
+              </a:defRPr>
+            </a:lvl5pPr>
+            <a:lvl6pPr marL="2286000" algn="l" defTabSz="914400" rtl="0" eaLnBrk="1" latinLnBrk="0" hangingPunct="1">
+              <a:defRPr sz="1800" kern="1200">
+                <a:solidFill>
+                  <a:schemeClr val="lt1"/>
+                </a:solidFill>
+                <a:latin typeface="+mn-lt"/>
+                <a:ea typeface="+mn-ea"/>
+                <a:cs typeface="+mn-cs"/>
+              </a:defRPr>
+            </a:lvl6pPr>
+            <a:lvl7pPr marL="2743200" algn="l" defTabSz="914400" rtl="0" eaLnBrk="1" latinLnBrk="0" hangingPunct="1">
+              <a:defRPr sz="1800" kern="1200">
+                <a:solidFill>
+                  <a:schemeClr val="lt1"/>
+                </a:solidFill>
+                <a:latin typeface="+mn-lt"/>
+                <a:ea typeface="+mn-ea"/>
+                <a:cs typeface="+mn-cs"/>
+              </a:defRPr>
+            </a:lvl7pPr>
+            <a:lvl8pPr marL="3200400" algn="l" defTabSz="914400" rtl="0" eaLnBrk="1" latinLnBrk="0" hangingPunct="1">
+              <a:defRPr sz="1800" kern="1200">
+                <a:solidFill>
+                  <a:schemeClr val="lt1"/>
+                </a:solidFill>
+                <a:latin typeface="+mn-lt"/>
+                <a:ea typeface="+mn-ea"/>
+                <a:cs typeface="+mn-cs"/>
+              </a:defRPr>
+            </a:lvl8pPr>
+            <a:lvl9pPr marL="3657600" algn="l" defTabSz="914400" rtl="0" eaLnBrk="1" latinLnBrk="0" hangingPunct="1">
+              <a:defRPr sz="1800" kern="1200">
+                <a:solidFill>
+                  <a:schemeClr val="lt1"/>
+                </a:solidFill>
+                <a:latin typeface="+mn-lt"/>
+                <a:ea typeface="+mn-ea"/>
+                <a:cs typeface="+mn-cs"/>
+              </a:defRPr>
+            </a:lvl9pPr>
+          </a:lstStyle>
+          <a:p>
+            <a:pPr algn="ctr"/>
+            <a:endParaRPr lang="en-US"/>
+          </a:p>
+        </p:txBody>
+      </p:sp>
+      <p:pic>
+        <p:nvPicPr>
+          <p:cNvPr id="2050" name="Picture 2" descr="Free Gorilla Monkey photo and picture">
+            <a:extLst>
+              <a:ext uri="{FF2B5EF4-FFF2-40B4-BE49-F238E27FC236}">
+                <a16:creationId xmlns:a16="http://schemas.microsoft.com/office/drawing/2014/main" id="{A3AC101E-E21E-D893-1200-311F7023AB84}"/>
+              </a:ext>
+            </a:extLst>
+          </p:cNvPr>
+          <p:cNvPicPr>
+            <a:picLocks noChangeAspect="1" noChangeArrowheads="1"/>
+          </p:cNvPicPr>
+          <p:nvPr/>
+        </p:nvPicPr>
+        <p:blipFill rotWithShape="1">
+          <a:blip r:embed="rId2">
+            <a:extLst>
+              <a:ext uri="{28A0092B-C50C-407E-A947-70E740481C1C}">
+                <a14:useLocalDpi xmlns:a14="http://schemas.microsoft.com/office/drawing/2010/main" val="0"/>
+              </a:ext>
+            </a:extLst>
+          </a:blip>
+          <a:srcRect t="8708" b="7038"/>
+          <a:stretch/>
+        </p:blipFill>
+        <p:spPr bwMode="auto">
+          <a:xfrm>
+            <a:off x="20" y="1282"/>
+            <a:ext cx="12191980" cy="6856718"/>
+          </a:xfrm>
+          <a:prstGeom prst="rect">
+            <a:avLst/>
+          </a:prstGeom>
+          <a:noFill/>
+          <a:extLst>
+            <a:ext uri="{909E8E84-426E-40DD-AFC4-6F175D3DCCD1}">
+              <a14:hiddenFill xmlns:a14="http://schemas.microsoft.com/office/drawing/2010/main">
+                <a:solidFill>
+                  <a:srgbClr val="FFFFFF"/>
+                </a:solidFill>
+              </a14:hiddenFill>
+            </a:ext>
+          </a:extLst>
+        </p:spPr>
+      </p:pic>
+      <p:sp>
+        <p:nvSpPr>
+          <p:cNvPr id="4" name="Rectangle 3">
+            <a:extLst>
+              <a:ext uri="{FF2B5EF4-FFF2-40B4-BE49-F238E27FC236}">
+                <a16:creationId xmlns:a16="http://schemas.microsoft.com/office/drawing/2014/main" id="{2E6FF007-8B92-F942-B6AC-446CA92807C0}"/>
+              </a:ext>
+            </a:extLst>
+          </p:cNvPr>
+          <p:cNvSpPr/>
+          <p:nvPr/>
+        </p:nvSpPr>
+        <p:spPr>
+          <a:xfrm>
+            <a:off x="0" y="0"/>
+            <a:ext cx="12190476" cy="6858000"/>
+          </a:xfrm>
+          <a:prstGeom prst="rect">
+            <a:avLst/>
+          </a:prstGeom>
+          <a:gradFill>
+            <a:gsLst>
+              <a:gs pos="40000">
+                <a:srgbClr val="CCD5AE">
+                  <a:alpha val="36863"/>
+                </a:srgbClr>
+              </a:gs>
+              <a:gs pos="80000">
+                <a:srgbClr val="E9EDC9">
+                  <a:alpha val="69020"/>
+                </a:srgbClr>
+              </a:gs>
+            </a:gsLst>
+            <a:lin ang="5400000" scaled="1"/>
+          </a:gradFill>
+        </p:spPr>
+        <p:style>
+          <a:lnRef idx="2">
+            <a:schemeClr val="accent1">
+              <a:shade val="50000"/>
+            </a:schemeClr>
+          </a:lnRef>
+          <a:fillRef idx="1">
+            <a:schemeClr val="accent1"/>
+          </a:fillRef>
+          <a:effectRef idx="0">
+            <a:schemeClr val="accent1"/>
+          </a:effectRef>
+          <a:fontRef idx="minor">
+            <a:schemeClr val="lt1"/>
+          </a:fontRef>
+        </p:style>
+        <p:txBody>
+          <a:bodyPr rtlCol="0" anchor="ctr"/>
+          <a:lstStyle/>
+          <a:p>
+            <a:pPr algn="ctr"/>
+            <a:endParaRPr lang="en-NL"/>
+          </a:p>
+        </p:txBody>
+      </p:sp>
+      <p:sp>
+        <p:nvSpPr>
+          <p:cNvPr id="3" name="TextBox 2">
+            <a:extLst>
+              <a:ext uri="{FF2B5EF4-FFF2-40B4-BE49-F238E27FC236}">
+                <a16:creationId xmlns:a16="http://schemas.microsoft.com/office/drawing/2014/main" id="{14B5DA94-7A10-77B0-246F-6B12604A146F}"/>
+              </a:ext>
+            </a:extLst>
+          </p:cNvPr>
+          <p:cNvSpPr txBox="1"/>
+          <p:nvPr/>
+        </p:nvSpPr>
+        <p:spPr>
+          <a:xfrm>
+            <a:off x="5348888" y="5987946"/>
+            <a:ext cx="6841588" cy="461665"/>
+          </a:xfrm>
+          <a:prstGeom prst="rect">
+            <a:avLst/>
+          </a:prstGeom>
+          <a:noFill/>
+        </p:spPr>
+        <p:txBody>
+          <a:bodyPr wrap="square" rtlCol="0">
+            <a:spAutoFit/>
+          </a:bodyPr>
+          <a:lstStyle/>
+          <a:p>
+            <a:r>
+              <a:rPr lang="en-GB" sz="2400" dirty="0">
+                <a:solidFill>
+                  <a:schemeClr val="tx1">
+                    <a:lumMod val="75000"/>
+                    <a:lumOff val="25000"/>
+                  </a:schemeClr>
+                </a:solidFill>
+                <a:latin typeface="Aharoni" panose="02010803020104030203" pitchFamily="2" charset="-79"/>
+                <a:cs typeface="Aharoni" panose="02010803020104030203" pitchFamily="2" charset="-79"/>
+              </a:rPr>
+              <a:t>U</a:t>
+            </a:r>
+            <a:r>
+              <a:rPr lang="en-NL" sz="2400" dirty="0">
+                <a:solidFill>
+                  <a:schemeClr val="tx1">
+                    <a:lumMod val="75000"/>
+                    <a:lumOff val="25000"/>
+                  </a:schemeClr>
+                </a:solidFill>
+                <a:latin typeface="Aharoni" panose="02010803020104030203" pitchFamily="2" charset="-79"/>
+                <a:cs typeface="Aharoni" panose="02010803020104030203" pitchFamily="2" charset="-79"/>
+              </a:rPr>
+              <a:t>nderstanding Dawin natural selection theory</a:t>
+            </a:r>
+          </a:p>
+        </p:txBody>
+      </p:sp>
+      <p:sp>
+        <p:nvSpPr>
+          <p:cNvPr id="2" name="TextBox 1">
+            <a:extLst>
+              <a:ext uri="{FF2B5EF4-FFF2-40B4-BE49-F238E27FC236}">
+                <a16:creationId xmlns:a16="http://schemas.microsoft.com/office/drawing/2014/main" id="{F1356728-EC7C-C108-4EBA-81AFF23E3AFC}"/>
+              </a:ext>
+            </a:extLst>
+          </p:cNvPr>
+          <p:cNvSpPr txBox="1"/>
+          <p:nvPr/>
+        </p:nvSpPr>
+        <p:spPr>
+          <a:xfrm>
+            <a:off x="126608" y="295421"/>
+            <a:ext cx="8412481" cy="923330"/>
+          </a:xfrm>
+          <a:prstGeom prst="rect">
+            <a:avLst/>
+          </a:prstGeom>
+          <a:noFill/>
+        </p:spPr>
+        <p:txBody>
+          <a:bodyPr wrap="square" rtlCol="0">
+            <a:spAutoFit/>
+          </a:bodyPr>
+          <a:lstStyle/>
+          <a:p>
+            <a:r>
+              <a:rPr lang="en-NL" sz="5400">
+                <a:latin typeface="Aharoni" panose="02010803020104030203" pitchFamily="2" charset="-79"/>
+                <a:cs typeface="Aharoni" panose="02010803020104030203" pitchFamily="2" charset="-79"/>
+              </a:rPr>
+              <a:t>Searching for ancestors</a:t>
+            </a:r>
+            <a:endParaRPr lang="en-NL" sz="5400" dirty="0">
+              <a:latin typeface="Aharoni" panose="02010803020104030203" pitchFamily="2" charset="-79"/>
+              <a:cs typeface="Aharoni" panose="02010803020104030203" pitchFamily="2" charset="-79"/>
+            </a:endParaRPr>
+          </a:p>
+        </p:txBody>
+      </p:sp>
+    </p:spTree>
+    <p:extLst>
+      <p:ext uri="{BB962C8B-B14F-4D97-AF65-F5344CB8AC3E}">
+        <p14:creationId xmlns:p14="http://schemas.microsoft.com/office/powerpoint/2010/main" val="4112216634"/>
+      </p:ext>
+    </p:extLst>
+  </p:cSld>
+  <p:clrMapOvr>
+    <a:masterClrMapping/>
+  </p:clrMapOvr>
+</p:sld>
+</file>
+
+<file path=ppt/slides/slide7.xml><?xml version="1.0" encoding="utf-8"?>
+<p:sld xmlns:a="http://schemas.openxmlformats.org/drawingml/2006/main" xmlns:r="http://schemas.openxmlformats.org/officeDocument/2006/relationships" xmlns:p="http://schemas.openxmlformats.org/presentationml/2006/main">
+  <p:cSld>
+    <p:spTree>
+      <p:nvGrpSpPr>
+        <p:cNvPr id="1" name=""/>
+        <p:cNvGrpSpPr/>
+        <p:nvPr/>
+      </p:nvGrpSpPr>
+      <p:grpSpPr>
+        <a:xfrm>
+          <a:off x="0" y="0"/>
+          <a:ext cx="0" cy="0"/>
+          <a:chOff x="0" y="0"/>
+          <a:chExt cx="0" cy="0"/>
+        </a:xfrm>
+      </p:grpSpPr>
+      <p:sp>
+        <p:nvSpPr>
+          <p:cNvPr id="12" name="Oval 11">
+            <a:extLst>
+              <a:ext uri="{FF2B5EF4-FFF2-40B4-BE49-F238E27FC236}">
+                <a16:creationId xmlns:a16="http://schemas.microsoft.com/office/drawing/2014/main" id="{3BE07236-9B10-0F30-0D76-94AB201B4F9F}"/>
+              </a:ext>
+            </a:extLst>
+          </p:cNvPr>
+          <p:cNvSpPr/>
+          <p:nvPr/>
+        </p:nvSpPr>
+        <p:spPr>
+          <a:xfrm>
+            <a:off x="-1295867" y="66821"/>
+            <a:ext cx="6527409" cy="6724357"/>
+          </a:xfrm>
+          <a:prstGeom prst="ellipse">
+            <a:avLst/>
+          </a:prstGeom>
+          <a:gradFill>
+            <a:gsLst>
+              <a:gs pos="25000">
+                <a:srgbClr val="D4A373"/>
+              </a:gs>
+              <a:gs pos="71000">
+                <a:srgbClr val="FEFAE0">
+                  <a:alpha val="69020"/>
+                </a:srgbClr>
+              </a:gs>
+            </a:gsLst>
+            <a:lin ang="5400000" scaled="1"/>
+          </a:gradFill>
+          <a:ln>
+            <a:noFill/>
+          </a:ln>
+        </p:spPr>
+        <p:style>
+          <a:lnRef idx="2">
+            <a:schemeClr val="accent1">
+              <a:shade val="50000"/>
+            </a:schemeClr>
+          </a:lnRef>
+          <a:fillRef idx="1">
+            <a:schemeClr val="accent1"/>
+          </a:fillRef>
+          <a:effectRef idx="0">
+            <a:schemeClr val="accent1"/>
+          </a:effectRef>
+          <a:fontRef idx="minor">
+            <a:schemeClr val="lt1"/>
+          </a:fontRef>
+        </p:style>
+        <p:txBody>
+          <a:bodyPr rtlCol="0" anchor="ctr"/>
+          <a:lstStyle/>
+          <a:p>
+            <a:pPr algn="ctr"/>
+            <a:endParaRPr lang="en-NL"/>
+          </a:p>
+        </p:txBody>
+      </p:sp>
+      <p:sp>
+        <p:nvSpPr>
+          <p:cNvPr id="11" name="Freeform 10">
+            <a:extLst>
+              <a:ext uri="{FF2B5EF4-FFF2-40B4-BE49-F238E27FC236}">
+                <a16:creationId xmlns:a16="http://schemas.microsoft.com/office/drawing/2014/main" id="{469E1017-5D64-5486-395D-EA7CEE0DFB61}"/>
+              </a:ext>
+            </a:extLst>
+          </p:cNvPr>
+          <p:cNvSpPr/>
+          <p:nvPr/>
+        </p:nvSpPr>
+        <p:spPr>
+          <a:xfrm>
+            <a:off x="-1463040" y="0"/>
+            <a:ext cx="12192000" cy="6858000"/>
+          </a:xfrm>
+          <a:custGeom>
+            <a:avLst/>
+            <a:gdLst>
+              <a:gd name="connsiteX0" fmla="*/ 2173471 w 12192000"/>
+              <a:gd name="connsiteY0" fmla="*/ 538089 h 6858000"/>
+              <a:gd name="connsiteX1" fmla="*/ 1547446 w 12192000"/>
+              <a:gd name="connsiteY1" fmla="*/ 1164114 h 6858000"/>
+              <a:gd name="connsiteX2" fmla="*/ 1547446 w 12192000"/>
+              <a:gd name="connsiteY2" fmla="*/ 5693885 h 6858000"/>
+              <a:gd name="connsiteX3" fmla="*/ 2173471 w 12192000"/>
+              <a:gd name="connsiteY3" fmla="*/ 6319910 h 6858000"/>
+              <a:gd name="connsiteX4" fmla="*/ 4677495 w 12192000"/>
+              <a:gd name="connsiteY4" fmla="*/ 6319910 h 6858000"/>
+              <a:gd name="connsiteX5" fmla="*/ 5303520 w 12192000"/>
+              <a:gd name="connsiteY5" fmla="*/ 5693885 h 6858000"/>
+              <a:gd name="connsiteX6" fmla="*/ 5303520 w 12192000"/>
+              <a:gd name="connsiteY6" fmla="*/ 1164114 h 6858000"/>
+              <a:gd name="connsiteX7" fmla="*/ 4677495 w 12192000"/>
+              <a:gd name="connsiteY7" fmla="*/ 538089 h 6858000"/>
+              <a:gd name="connsiteX8" fmla="*/ 0 w 12192000"/>
+              <a:gd name="connsiteY8" fmla="*/ 0 h 6858000"/>
+              <a:gd name="connsiteX9" fmla="*/ 12192000 w 12192000"/>
+              <a:gd name="connsiteY9" fmla="*/ 0 h 6858000"/>
+              <a:gd name="connsiteX10" fmla="*/ 12192000 w 12192000"/>
+              <a:gd name="connsiteY10" fmla="*/ 6858000 h 6858000"/>
+              <a:gd name="connsiteX11" fmla="*/ 0 w 12192000"/>
+              <a:gd name="connsiteY11" fmla="*/ 6858000 h 6858000"/>
+            </a:gdLst>
+            <a:ahLst/>
+            <a:cxnLst>
+              <a:cxn ang="0">
+                <a:pos x="connsiteX0" y="connsiteY0"/>
+              </a:cxn>
+              <a:cxn ang="0">
+                <a:pos x="connsiteX1" y="connsiteY1"/>
+              </a:cxn>
+              <a:cxn ang="0">
+                <a:pos x="connsiteX2" y="connsiteY2"/>
+              </a:cxn>
+              <a:cxn ang="0">
+                <a:pos x="connsiteX3" y="connsiteY3"/>
+              </a:cxn>
+              <a:cxn ang="0">
+                <a:pos x="connsiteX4" y="connsiteY4"/>
+              </a:cxn>
+              <a:cxn ang="0">
+                <a:pos x="connsiteX5" y="connsiteY5"/>
+              </a:cxn>
+              <a:cxn ang="0">
+                <a:pos x="connsiteX6" y="connsiteY6"/>
+              </a:cxn>
+              <a:cxn ang="0">
+                <a:pos x="connsiteX7" y="connsiteY7"/>
+              </a:cxn>
+              <a:cxn ang="0">
+                <a:pos x="connsiteX8" y="connsiteY8"/>
+              </a:cxn>
+              <a:cxn ang="0">
+                <a:pos x="connsiteX9" y="connsiteY9"/>
+              </a:cxn>
+              <a:cxn ang="0">
+                <a:pos x="connsiteX10" y="connsiteY10"/>
+              </a:cxn>
+              <a:cxn ang="0">
+                <a:pos x="connsiteX11" y="connsiteY11"/>
+              </a:cxn>
+            </a:cxnLst>
+            <a:rect l="l" t="t" r="r" b="b"/>
+            <a:pathLst>
+              <a:path w="12192000" h="6858000">
+                <a:moveTo>
+                  <a:pt x="2173471" y="538089"/>
+                </a:moveTo>
+                <a:cubicBezTo>
+                  <a:pt x="1827727" y="538089"/>
+                  <a:pt x="1547446" y="818370"/>
+                  <a:pt x="1547446" y="1164114"/>
+                </a:cubicBezTo>
+                <a:lnTo>
+                  <a:pt x="1547446" y="5693885"/>
+                </a:lnTo>
+                <a:cubicBezTo>
+                  <a:pt x="1547446" y="6039629"/>
+                  <a:pt x="1827727" y="6319910"/>
+                  <a:pt x="2173471" y="6319910"/>
+                </a:cubicBezTo>
+                <a:lnTo>
+                  <a:pt x="4677495" y="6319910"/>
+                </a:lnTo>
+                <a:cubicBezTo>
+                  <a:pt x="5023239" y="6319910"/>
+                  <a:pt x="5303520" y="6039629"/>
+                  <a:pt x="5303520" y="5693885"/>
+                </a:cubicBezTo>
+                <a:lnTo>
+                  <a:pt x="5303520" y="1164114"/>
+                </a:lnTo>
+                <a:cubicBezTo>
+                  <a:pt x="5303520" y="818370"/>
+                  <a:pt x="5023239" y="538089"/>
+                  <a:pt x="4677495" y="538089"/>
+                </a:cubicBezTo>
+                <a:close/>
+                <a:moveTo>
+                  <a:pt x="0" y="0"/>
+                </a:moveTo>
+                <a:lnTo>
+                  <a:pt x="12192000" y="0"/>
+                </a:lnTo>
+                <a:lnTo>
+                  <a:pt x="12192000" y="6858000"/>
+                </a:lnTo>
+                <a:lnTo>
+                  <a:pt x="0" y="6858000"/>
+                </a:lnTo>
+                <a:close/>
+              </a:path>
+            </a:pathLst>
+          </a:custGeom>
+          <a:solidFill>
+            <a:schemeClr val="bg1"/>
+          </a:solidFill>
+        </p:spPr>
+        <p:style>
+          <a:lnRef idx="2">
+            <a:schemeClr val="accent1">
+              <a:shade val="50000"/>
+            </a:schemeClr>
+          </a:lnRef>
+          <a:fillRef idx="1">
+            <a:schemeClr val="accent1"/>
+          </a:fillRef>
+          <a:effectRef idx="0">
+            <a:schemeClr val="accent1"/>
+          </a:effectRef>
+          <a:fontRef idx="minor">
+            <a:schemeClr val="lt1"/>
+          </a:fontRef>
+        </p:style>
+        <p:txBody>
+          <a:bodyPr wrap="square" rtlCol="0" anchor="ctr">
+            <a:noAutofit/>
+          </a:bodyPr>
+          <a:lstStyle/>
+          <a:p>
+            <a:pPr algn="ctr"/>
+            <a:endParaRPr lang="en-NL"/>
+          </a:p>
+        </p:txBody>
+      </p:sp>
+      <p:sp>
+        <p:nvSpPr>
+          <p:cNvPr id="10" name="Rounded Rectangle 9">
+            <a:extLst>
+              <a:ext uri="{FF2B5EF4-FFF2-40B4-BE49-F238E27FC236}">
+                <a16:creationId xmlns:a16="http://schemas.microsoft.com/office/drawing/2014/main" id="{278BC94A-16A8-2E58-37D9-1559E6D94017}"/>
+              </a:ext>
+            </a:extLst>
+          </p:cNvPr>
+          <p:cNvSpPr/>
+          <p:nvPr/>
+        </p:nvSpPr>
+        <p:spPr>
+          <a:xfrm>
+            <a:off x="179602" y="676323"/>
+            <a:ext cx="3576472" cy="5505354"/>
+          </a:xfrm>
+          <a:prstGeom prst="roundRect">
+            <a:avLst/>
+          </a:prstGeom>
+          <a:solidFill>
+            <a:schemeClr val="bg1"/>
+          </a:solidFill>
+          <a:ln>
+            <a:solidFill>
+              <a:schemeClr val="tx1"/>
+            </a:solidFill>
+          </a:ln>
+        </p:spPr>
+        <p:style>
+          <a:lnRef idx="2">
+            <a:schemeClr val="accent1">
+              <a:shade val="50000"/>
+            </a:schemeClr>
+          </a:lnRef>
+          <a:fillRef idx="1">
+            <a:schemeClr val="accent1"/>
+          </a:fillRef>
+          <a:effectRef idx="0">
+            <a:schemeClr val="accent1"/>
+          </a:effectRef>
+          <a:fontRef idx="minor">
+            <a:schemeClr val="lt1"/>
+          </a:fontRef>
+        </p:style>
+        <p:txBody>
+          <a:bodyPr rtlCol="0" anchor="ctr"/>
+          <a:lstStyle/>
+          <a:p>
+            <a:pPr algn="ctr"/>
+            <a:r>
+              <a:rPr lang="en-NL" dirty="0"/>
+              <a:t>=lorem</a:t>
+            </a:r>
+          </a:p>
+        </p:txBody>
+      </p:sp>
+      <p:sp>
+        <p:nvSpPr>
+          <p:cNvPr id="13" name="TextBox 12">
+            <a:extLst>
+              <a:ext uri="{FF2B5EF4-FFF2-40B4-BE49-F238E27FC236}">
+                <a16:creationId xmlns:a16="http://schemas.microsoft.com/office/drawing/2014/main" id="{4ABFD6FF-73AE-1B47-ADC3-B58DC59DCD09}"/>
+              </a:ext>
+            </a:extLst>
+          </p:cNvPr>
+          <p:cNvSpPr txBox="1"/>
+          <p:nvPr/>
+        </p:nvSpPr>
+        <p:spPr>
+          <a:xfrm>
+            <a:off x="464234" y="1069145"/>
+            <a:ext cx="3052689" cy="5355312"/>
+          </a:xfrm>
+          <a:prstGeom prst="rect">
+            <a:avLst/>
+          </a:prstGeom>
+          <a:noFill/>
+        </p:spPr>
+        <p:txBody>
+          <a:bodyPr wrap="square" rtlCol="0">
+            <a:spAutoFit/>
+          </a:bodyPr>
+          <a:lstStyle/>
+          <a:p>
+            <a:r>
+              <a:rPr lang="en-GB" dirty="0"/>
+              <a:t>Lorem ipsum dolor sit amet, consectetuer adipiscing elit. Maecenas porttitor congue massa. Fusce posuere, magna sed pulvinar ultricies, purus lectus malesuada libero, sit amet commodo magna eros quis urna.</a:t>
+            </a:r>
+          </a:p>
+          <a:p>
+            <a:endParaRPr lang="en-GB" dirty="0"/>
+          </a:p>
+          <a:p>
+            <a:r>
+              <a:rPr lang="en-GB" dirty="0"/>
+              <a:t>Nunc viverra imperdiet enim. Fusce est. Vivamus a tellus.</a:t>
+            </a:r>
+          </a:p>
+          <a:p>
+            <a:endParaRPr lang="en-GB" dirty="0"/>
+          </a:p>
+          <a:p>
+            <a:r>
+              <a:rPr lang="en-GB" dirty="0"/>
+              <a:t>Pellentesque habitant morbi tristique senectus et netus et malesuada fames ac turpis egestas. Proin pharetra nonummy pede. Mauris et orci.</a:t>
+            </a:r>
+            <a:endParaRPr lang="en-NL" dirty="0"/>
+          </a:p>
+          <a:p>
+            <a:endParaRPr lang="en-NL" dirty="0"/>
+          </a:p>
+        </p:txBody>
+      </p:sp>
+      <p:pic>
+        <p:nvPicPr>
+          <p:cNvPr id="3074" name="Picture 2" descr="Free Monkey Primate photo and picture">
+            <a:extLst>
+              <a:ext uri="{FF2B5EF4-FFF2-40B4-BE49-F238E27FC236}">
+                <a16:creationId xmlns:a16="http://schemas.microsoft.com/office/drawing/2014/main" id="{6C7DC8DE-EA27-F64C-6FF5-91B436B2ACCB}"/>
+              </a:ext>
+            </a:extLst>
+          </p:cNvPr>
+          <p:cNvPicPr>
+            <a:picLocks noChangeAspect="1" noChangeArrowheads="1"/>
+          </p:cNvPicPr>
+          <p:nvPr/>
+        </p:nvPicPr>
+        <p:blipFill>
+          <a:blip r:embed="rId2">
+            <a:extLst>
+              <a:ext uri="{28A0092B-C50C-407E-A947-70E740481C1C}">
+                <a14:useLocalDpi xmlns:a14="http://schemas.microsoft.com/office/drawing/2010/main" val="0"/>
+              </a:ext>
+            </a:extLst>
+          </a:blip>
+          <a:srcRect/>
+          <a:stretch>
+            <a:fillRect/>
+          </a:stretch>
+        </p:blipFill>
+        <p:spPr bwMode="auto">
+          <a:xfrm>
+            <a:off x="3928165" y="-1"/>
+            <a:ext cx="9486900" cy="6858000"/>
+          </a:xfrm>
+          <a:prstGeom prst="rect">
+            <a:avLst/>
+          </a:prstGeom>
+          <a:noFill/>
+          <a:extLst>
+            <a:ext uri="{909E8E84-426E-40DD-AFC4-6F175D3DCCD1}">
+              <a14:hiddenFill xmlns:a14="http://schemas.microsoft.com/office/drawing/2010/main">
+                <a:solidFill>
+                  <a:srgbClr val="FFFFFF"/>
+                </a:solidFill>
+              </a14:hiddenFill>
+            </a:ext>
+          </a:extLst>
+        </p:spPr>
+      </p:pic>
+      <p:sp>
+        <p:nvSpPr>
+          <p:cNvPr id="15" name="Rectangle 14">
+            <a:extLst>
+              <a:ext uri="{FF2B5EF4-FFF2-40B4-BE49-F238E27FC236}">
+                <a16:creationId xmlns:a16="http://schemas.microsoft.com/office/drawing/2014/main" id="{F0C14454-6043-5B72-0632-889CFA827651}"/>
+              </a:ext>
+            </a:extLst>
+          </p:cNvPr>
+          <p:cNvSpPr/>
+          <p:nvPr/>
+        </p:nvSpPr>
+        <p:spPr>
+          <a:xfrm>
+            <a:off x="3928165" y="0"/>
+            <a:ext cx="9534617" cy="6858000"/>
+          </a:xfrm>
+          <a:prstGeom prst="rect">
+            <a:avLst/>
+          </a:prstGeom>
+          <a:gradFill flip="none" rotWithShape="1">
+            <a:gsLst>
+              <a:gs pos="16000">
+                <a:srgbClr val="D4A373">
+                  <a:alpha val="72078"/>
+                </a:srgbClr>
+              </a:gs>
+              <a:gs pos="31000">
+                <a:srgbClr val="FEFAE0">
+                  <a:alpha val="73066"/>
+                </a:srgbClr>
+              </a:gs>
+            </a:gsLst>
+            <a:lin ang="10800000" scaled="1"/>
+            <a:tileRect/>
+          </a:gradFill>
+          <a:ln>
+            <a:noFill/>
+          </a:ln>
+        </p:spPr>
+        <p:style>
+          <a:lnRef idx="2">
+            <a:schemeClr val="accent1">
+              <a:shade val="50000"/>
+            </a:schemeClr>
+          </a:lnRef>
+          <a:fillRef idx="1">
+            <a:schemeClr val="accent1"/>
+          </a:fillRef>
+          <a:effectRef idx="0">
+            <a:schemeClr val="accent1"/>
+          </a:effectRef>
+          <a:fontRef idx="minor">
+            <a:schemeClr val="lt1"/>
+          </a:fontRef>
+        </p:style>
+        <p:txBody>
+          <a:bodyPr rtlCol="0" anchor="ctr"/>
+          <a:lstStyle/>
+          <a:p>
+            <a:pPr algn="ctr"/>
+            <a:endParaRPr lang="en-NL"/>
+          </a:p>
+        </p:txBody>
+      </p:sp>
+      <p:sp>
+        <p:nvSpPr>
+          <p:cNvPr id="14" name="TextBox 13">
+            <a:extLst>
+              <a:ext uri="{FF2B5EF4-FFF2-40B4-BE49-F238E27FC236}">
+                <a16:creationId xmlns:a16="http://schemas.microsoft.com/office/drawing/2014/main" id="{257B87CA-16DB-D398-08AD-EE25F7E61592}"/>
+              </a:ext>
+            </a:extLst>
+          </p:cNvPr>
+          <p:cNvSpPr txBox="1"/>
+          <p:nvPr/>
+        </p:nvSpPr>
+        <p:spPr>
+          <a:xfrm>
+            <a:off x="4117145" y="66820"/>
+            <a:ext cx="8488214" cy="923330"/>
+          </a:xfrm>
+          <a:prstGeom prst="rect">
+            <a:avLst/>
+          </a:prstGeom>
+          <a:noFill/>
+        </p:spPr>
+        <p:txBody>
+          <a:bodyPr wrap="square" rtlCol="0">
+            <a:spAutoFit/>
+          </a:bodyPr>
+          <a:lstStyle/>
+          <a:p>
+            <a:pPr algn="ctr"/>
+            <a:r>
+              <a:rPr lang="en-GB" sz="5400" dirty="0">
+                <a:latin typeface="Aharoni" panose="02010803020104030203" pitchFamily="2" charset="-79"/>
+                <a:cs typeface="Aharoni" panose="02010803020104030203" pitchFamily="2" charset="-79"/>
+              </a:rPr>
+              <a:t>W</a:t>
+            </a:r>
+            <a:r>
+              <a:rPr lang="en-NL" sz="5400" dirty="0">
+                <a:latin typeface="Aharoni" panose="02010803020104030203" pitchFamily="2" charset="-79"/>
+                <a:cs typeface="Aharoni" panose="02010803020104030203" pitchFamily="2" charset="-79"/>
+              </a:rPr>
+              <a:t>hat we know so far</a:t>
+            </a:r>
+          </a:p>
+        </p:txBody>
+      </p:sp>
+    </p:spTree>
+    <p:extLst>
+      <p:ext uri="{BB962C8B-B14F-4D97-AF65-F5344CB8AC3E}">
+        <p14:creationId xmlns:p14="http://schemas.microsoft.com/office/powerpoint/2010/main" val="761188211"/>
+      </p:ext>
+    </p:extLst>
+  </p:cSld>
+  <p:clrMapOvr>
+    <a:masterClrMapping/>
+  </p:clrMapOvr>
+  <p:timing>
+    <p:tnLst>
+      <p:par>
+        <p:cTn id="1" dur="indefinite" restart="never" nodeType="tmRoot">
+          <p:childTnLst>
+            <p:seq concurrent="1" nextAc="seek">
+              <p:cTn id="2" dur="indefinite" nodeType="mainSeq">
+                <p:childTnLst>
+                  <p:par>
+                    <p:cTn id="3" fill="hold">
+                      <p:stCondLst>
+                        <p:cond delay="indefinite"/>
+                        <p:cond evt="onBegin" delay="0">
+                          <p:tn val="2"/>
+                        </p:cond>
+                      </p:stCondLst>
+                      <p:childTnLst>
+                        <p:par>
+                          <p:cTn id="4" fill="hold">
+                            <p:stCondLst>
+                              <p:cond delay="0"/>
+                            </p:stCondLst>
+                            <p:childTnLst>
+                              <p:par>
+                                <p:cTn id="5" presetID="8" presetClass="emph" presetSubtype="0" repeatCount="indefinite" fill="hold" grpId="0" nodeType="withEffect">
+                                  <p:stCondLst>
+                                    <p:cond delay="0"/>
+                                  </p:stCondLst>
+                                  <p:childTnLst>
+                                    <p:animRot by="21600000">
+                                      <p:cBhvr>
+                                        <p:cTn id="6" dur="3000" fill="hold"/>
+                                        <p:tgtEl>
+                                          <p:spTgt spid="12"/>
+                                        </p:tgtEl>
+                                        <p:attrNameLst>
+                                          <p:attrName>r</p:attrName>
+                                        </p:attrNameLst>
+                                      </p:cBhvr>
+                                    </p:animRot>
+                                  </p:childTnLst>
+                                </p:cTn>
+                              </p:par>
+                            </p:childTnLst>
+                          </p:cTn>
+                        </p:par>
+                      </p:childTnLst>
+                    </p:cTn>
+                  </p:par>
+                </p:childTnLst>
+              </p:cTn>
+              <p:prevCondLst>
+                <p:cond evt="onPrev" delay="0">
+                  <p:tgtEl>
+                    <p:sldTgt/>
+                  </p:tgtEl>
+                </p:cond>
+              </p:prevCondLst>
+              <p:nextCondLst>
+                <p:cond evt="onNext" delay="0">
+                  <p:tgtEl>
+                    <p:sldTgt/>
+                  </p:tgtEl>
+                </p:cond>
+              </p:nextCondLst>
+            </p:seq>
+          </p:childTnLst>
+        </p:cTn>
+      </p:par>
+    </p:tnLst>
+    <p:bldLst>
+      <p:bldP spid="12" grpId="0" animBg="1"/>
+    </p:bldLst>
+  </p:timing>
 </p:sld>
 </file>
 

</xml_diff>

<commit_message>
ideias 10:: by sergio giraldo @ 20230318T2112CET, gpg signed
</commit_message>
<xml_diff>
--- a/powerpoint/ideas10.pptx
+++ b/powerpoint/ideas10.pptx
@@ -5,7 +5,7 @@
     <p:sldMasterId id="2147483648" r:id="rId1"/>
   </p:sldMasterIdLst>
   <p:notesMasterIdLst>
-    <p:notesMasterId r:id="rId9"/>
+    <p:notesMasterId r:id="rId10"/>
   </p:notesMasterIdLst>
   <p:sldIdLst>
     <p:sldId id="257" r:id="rId2"/>
@@ -15,6 +15,7 @@
     <p:sldId id="262" r:id="rId6"/>
     <p:sldId id="263" r:id="rId7"/>
     <p:sldId id="264" r:id="rId8"/>
+    <p:sldId id="265" r:id="rId9"/>
   </p:sldIdLst>
   <p:sldSz cx="12192000" cy="6858000"/>
   <p:notesSz cx="6858000" cy="9144000"/>
@@ -480,6 +481,90 @@
     </a:lvl9pPr>
   </p:notesStyle>
 </p:notesMaster>
+</file>
+
+<file path=ppt/notesSlides/notesSlide1.xml><?xml version="1.0" encoding="utf-8"?>
+<p:notes xmlns:a="http://schemas.openxmlformats.org/drawingml/2006/main" xmlns:r="http://schemas.openxmlformats.org/officeDocument/2006/relationships" xmlns:p="http://schemas.openxmlformats.org/presentationml/2006/main">
+  <p:cSld>
+    <p:spTree>
+      <p:nvGrpSpPr>
+        <p:cNvPr id="1" name=""/>
+        <p:cNvGrpSpPr/>
+        <p:nvPr/>
+      </p:nvGrpSpPr>
+      <p:grpSpPr>
+        <a:xfrm>
+          <a:off x="0" y="0"/>
+          <a:ext cx="0" cy="0"/>
+          <a:chOff x="0" y="0"/>
+          <a:chExt cx="0" cy="0"/>
+        </a:xfrm>
+      </p:grpSpPr>
+      <p:sp>
+        <p:nvSpPr>
+          <p:cNvPr id="2" name="Slide Image Placeholder 1"/>
+          <p:cNvSpPr>
+            <a:spLocks noGrp="1" noRot="1" noChangeAspect="1"/>
+          </p:cNvSpPr>
+          <p:nvPr>
+            <p:ph type="sldImg"/>
+          </p:nvPr>
+        </p:nvSpPr>
+        <p:spPr/>
+      </p:sp>
+      <p:sp>
+        <p:nvSpPr>
+          <p:cNvPr id="3" name="Notes Placeholder 2"/>
+          <p:cNvSpPr>
+            <a:spLocks noGrp="1"/>
+          </p:cNvSpPr>
+          <p:nvPr>
+            <p:ph type="body" idx="1"/>
+          </p:nvPr>
+        </p:nvSpPr>
+        <p:spPr/>
+        <p:txBody>
+          <a:bodyPr/>
+          <a:lstStyle/>
+          <a:p>
+            <a:endParaRPr lang="en-NL" dirty="0"/>
+          </a:p>
+        </p:txBody>
+      </p:sp>
+      <p:sp>
+        <p:nvSpPr>
+          <p:cNvPr id="4" name="Slide Number Placeholder 3"/>
+          <p:cNvSpPr>
+            <a:spLocks noGrp="1"/>
+          </p:cNvSpPr>
+          <p:nvPr>
+            <p:ph type="sldNum" sz="quarter" idx="5"/>
+          </p:nvPr>
+        </p:nvSpPr>
+        <p:spPr/>
+        <p:txBody>
+          <a:bodyPr/>
+          <a:lstStyle/>
+          <a:p>
+            <a:fld id="{1137602B-3A61-1143-A2AE-CDD2321A8C31}" type="slidenum">
+              <a:rPr lang="en-NL" smtClean="0"/>
+              <a:t>8</a:t>
+            </a:fld>
+            <a:endParaRPr lang="en-NL"/>
+          </a:p>
+        </p:txBody>
+      </p:sp>
+    </p:spTree>
+    <p:extLst>
+      <p:ext uri="{BB962C8B-B14F-4D97-AF65-F5344CB8AC3E}">
+        <p14:creationId xmlns:p14="http://schemas.microsoft.com/office/powerpoint/2010/main" val="2894650159"/>
+      </p:ext>
+    </p:extLst>
+  </p:cSld>
+  <p:clrMapOvr>
+    <a:masterClrMapping/>
+  </p:clrMapOvr>
+</p:notes>
 </file>
 
 <file path=ppt/slideLayouts/slideLayout1.xml><?xml version="1.0" encoding="utf-8"?>
@@ -9157,6 +9242,1056 @@
       </p:par>
     </p:tnLst>
     <p:bldLst>
+      <p:bldP spid="12" grpId="0" animBg="1"/>
+    </p:bldLst>
+  </p:timing>
+</p:sld>
+</file>
+
+<file path=ppt/slides/slide8.xml><?xml version="1.0" encoding="utf-8"?>
+<p:sld xmlns:a="http://schemas.openxmlformats.org/drawingml/2006/main" xmlns:r="http://schemas.openxmlformats.org/officeDocument/2006/relationships" xmlns:p="http://schemas.openxmlformats.org/presentationml/2006/main">
+  <p:cSld>
+    <p:spTree>
+      <p:nvGrpSpPr>
+        <p:cNvPr id="1" name=""/>
+        <p:cNvGrpSpPr/>
+        <p:nvPr/>
+      </p:nvGrpSpPr>
+      <p:grpSpPr>
+        <a:xfrm>
+          <a:off x="0" y="0"/>
+          <a:ext cx="0" cy="0"/>
+          <a:chOff x="0" y="0"/>
+          <a:chExt cx="0" cy="0"/>
+        </a:xfrm>
+      </p:grpSpPr>
+      <p:pic>
+        <p:nvPicPr>
+          <p:cNvPr id="2" name="Picture 2" descr="Free Monkey Primate photo and picture">
+            <a:extLst>
+              <a:ext uri="{FF2B5EF4-FFF2-40B4-BE49-F238E27FC236}">
+                <a16:creationId xmlns:a16="http://schemas.microsoft.com/office/drawing/2014/main" id="{43198365-8E43-638F-2967-50F94887B85E}"/>
+              </a:ext>
+            </a:extLst>
+          </p:cNvPr>
+          <p:cNvPicPr>
+            <a:picLocks noChangeAspect="1" noChangeArrowheads="1"/>
+          </p:cNvPicPr>
+          <p:nvPr/>
+        </p:nvPicPr>
+        <p:blipFill rotWithShape="1">
+          <a:blip r:embed="rId3">
+            <a:alphaModFix amt="43000"/>
+            <a:extLst>
+              <a:ext uri="{28A0092B-C50C-407E-A947-70E740481C1C}">
+                <a14:useLocalDpi xmlns:a14="http://schemas.microsoft.com/office/drawing/2010/main" val="0"/>
+              </a:ext>
+            </a:extLst>
+          </a:blip>
+          <a:srcRect t="11095" b="11095"/>
+          <a:stretch/>
+        </p:blipFill>
+        <p:spPr bwMode="auto">
+          <a:xfrm>
+            <a:off x="0" y="0"/>
+            <a:ext cx="12192000" cy="6858000"/>
+          </a:xfrm>
+          <a:prstGeom prst="rect">
+            <a:avLst/>
+          </a:prstGeom>
+          <a:gradFill>
+            <a:gsLst>
+              <a:gs pos="22000">
+                <a:srgbClr val="FAEDCD"/>
+              </a:gs>
+              <a:gs pos="75000">
+                <a:srgbClr val="D4A373"/>
+              </a:gs>
+            </a:gsLst>
+            <a:lin ang="5400000" scaled="1"/>
+          </a:gradFill>
+        </p:spPr>
+      </p:pic>
+      <p:sp>
+        <p:nvSpPr>
+          <p:cNvPr id="10" name="TextBox 9">
+            <a:extLst>
+              <a:ext uri="{FF2B5EF4-FFF2-40B4-BE49-F238E27FC236}">
+                <a16:creationId xmlns:a16="http://schemas.microsoft.com/office/drawing/2014/main" id="{A9041BB7-B3B9-E6EA-A6E6-682D62ECB1D3}"/>
+              </a:ext>
+            </a:extLst>
+          </p:cNvPr>
+          <p:cNvSpPr txBox="1"/>
+          <p:nvPr/>
+        </p:nvSpPr>
+        <p:spPr>
+          <a:xfrm>
+            <a:off x="4117145" y="66820"/>
+            <a:ext cx="8488214" cy="923330"/>
+          </a:xfrm>
+          <a:prstGeom prst="rect">
+            <a:avLst/>
+          </a:prstGeom>
+          <a:noFill/>
+        </p:spPr>
+        <p:txBody>
+          <a:bodyPr wrap="square" rtlCol="0">
+            <a:spAutoFit/>
+          </a:bodyPr>
+          <a:lstStyle/>
+          <a:p>
+            <a:pPr algn="ctr"/>
+            <a:r>
+              <a:rPr lang="en-GB" sz="5400" dirty="0">
+                <a:latin typeface="Aharoni" panose="02010803020104030203" pitchFamily="2" charset="-79"/>
+                <a:cs typeface="Aharoni" panose="02010803020104030203" pitchFamily="2" charset="-79"/>
+              </a:rPr>
+              <a:t>W</a:t>
+            </a:r>
+            <a:r>
+              <a:rPr lang="en-NL" sz="5400" dirty="0">
+                <a:latin typeface="Aharoni" panose="02010803020104030203" pitchFamily="2" charset="-79"/>
+                <a:cs typeface="Aharoni" panose="02010803020104030203" pitchFamily="2" charset="-79"/>
+              </a:rPr>
+              <a:t>hat we know so far</a:t>
+            </a:r>
+          </a:p>
+        </p:txBody>
+      </p:sp>
+      <p:sp>
+        <p:nvSpPr>
+          <p:cNvPr id="8" name="Freeform 7">
+            <a:extLst>
+              <a:ext uri="{FF2B5EF4-FFF2-40B4-BE49-F238E27FC236}">
+                <a16:creationId xmlns:a16="http://schemas.microsoft.com/office/drawing/2014/main" id="{1C9F5254-6616-5F04-F676-E77044149CEA}"/>
+              </a:ext>
+            </a:extLst>
+          </p:cNvPr>
+          <p:cNvSpPr/>
+          <p:nvPr/>
+        </p:nvSpPr>
+        <p:spPr>
+          <a:xfrm>
+            <a:off x="672030" y="705079"/>
+            <a:ext cx="2467778" cy="3106757"/>
+          </a:xfrm>
+          <a:custGeom>
+            <a:avLst/>
+            <a:gdLst>
+              <a:gd name="connsiteX0" fmla="*/ 447415 w 2467778"/>
+              <a:gd name="connsiteY0" fmla="*/ 59674 h 3106757"/>
+              <a:gd name="connsiteX1" fmla="*/ 54166 w 2467778"/>
+              <a:gd name="connsiteY1" fmla="*/ 452923 h 3106757"/>
+              <a:gd name="connsiteX2" fmla="*/ 54166 w 2467778"/>
+              <a:gd name="connsiteY2" fmla="*/ 2653832 h 3106757"/>
+              <a:gd name="connsiteX3" fmla="*/ 447415 w 2467778"/>
+              <a:gd name="connsiteY3" fmla="*/ 3047081 h 3106757"/>
+              <a:gd name="connsiteX4" fmla="*/ 2020362 w 2467778"/>
+              <a:gd name="connsiteY4" fmla="*/ 3047081 h 3106757"/>
+              <a:gd name="connsiteX5" fmla="*/ 2413611 w 2467778"/>
+              <a:gd name="connsiteY5" fmla="*/ 2653832 h 3106757"/>
+              <a:gd name="connsiteX6" fmla="*/ 2413611 w 2467778"/>
+              <a:gd name="connsiteY6" fmla="*/ 452923 h 3106757"/>
+              <a:gd name="connsiteX7" fmla="*/ 2020362 w 2467778"/>
+              <a:gd name="connsiteY7" fmla="*/ 59674 h 3106757"/>
+              <a:gd name="connsiteX8" fmla="*/ 411305 w 2467778"/>
+              <a:gd name="connsiteY8" fmla="*/ 0 h 3106757"/>
+              <a:gd name="connsiteX9" fmla="*/ 2056473 w 2467778"/>
+              <a:gd name="connsiteY9" fmla="*/ 0 h 3106757"/>
+              <a:gd name="connsiteX10" fmla="*/ 2467778 w 2467778"/>
+              <a:gd name="connsiteY10" fmla="*/ 411305 h 3106757"/>
+              <a:gd name="connsiteX11" fmla="*/ 2467778 w 2467778"/>
+              <a:gd name="connsiteY11" fmla="*/ 2695452 h 3106757"/>
+              <a:gd name="connsiteX12" fmla="*/ 2056473 w 2467778"/>
+              <a:gd name="connsiteY12" fmla="*/ 3106757 h 3106757"/>
+              <a:gd name="connsiteX13" fmla="*/ 411305 w 2467778"/>
+              <a:gd name="connsiteY13" fmla="*/ 3106757 h 3106757"/>
+              <a:gd name="connsiteX14" fmla="*/ 0 w 2467778"/>
+              <a:gd name="connsiteY14" fmla="*/ 2695452 h 3106757"/>
+              <a:gd name="connsiteX15" fmla="*/ 0 w 2467778"/>
+              <a:gd name="connsiteY15" fmla="*/ 411305 h 3106757"/>
+              <a:gd name="connsiteX16" fmla="*/ 411305 w 2467778"/>
+              <a:gd name="connsiteY16" fmla="*/ 0 h 3106757"/>
+            </a:gdLst>
+            <a:ahLst/>
+            <a:cxnLst>
+              <a:cxn ang="0">
+                <a:pos x="connsiteX0" y="connsiteY0"/>
+              </a:cxn>
+              <a:cxn ang="0">
+                <a:pos x="connsiteX1" y="connsiteY1"/>
+              </a:cxn>
+              <a:cxn ang="0">
+                <a:pos x="connsiteX2" y="connsiteY2"/>
+              </a:cxn>
+              <a:cxn ang="0">
+                <a:pos x="connsiteX3" y="connsiteY3"/>
+              </a:cxn>
+              <a:cxn ang="0">
+                <a:pos x="connsiteX4" y="connsiteY4"/>
+              </a:cxn>
+              <a:cxn ang="0">
+                <a:pos x="connsiteX5" y="connsiteY5"/>
+              </a:cxn>
+              <a:cxn ang="0">
+                <a:pos x="connsiteX6" y="connsiteY6"/>
+              </a:cxn>
+              <a:cxn ang="0">
+                <a:pos x="connsiteX7" y="connsiteY7"/>
+              </a:cxn>
+              <a:cxn ang="0">
+                <a:pos x="connsiteX8" y="connsiteY8"/>
+              </a:cxn>
+              <a:cxn ang="0">
+                <a:pos x="connsiteX9" y="connsiteY9"/>
+              </a:cxn>
+              <a:cxn ang="0">
+                <a:pos x="connsiteX10" y="connsiteY10"/>
+              </a:cxn>
+              <a:cxn ang="0">
+                <a:pos x="connsiteX11" y="connsiteY11"/>
+              </a:cxn>
+              <a:cxn ang="0">
+                <a:pos x="connsiteX12" y="connsiteY12"/>
+              </a:cxn>
+              <a:cxn ang="0">
+                <a:pos x="connsiteX13" y="connsiteY13"/>
+              </a:cxn>
+              <a:cxn ang="0">
+                <a:pos x="connsiteX14" y="connsiteY14"/>
+              </a:cxn>
+              <a:cxn ang="0">
+                <a:pos x="connsiteX15" y="connsiteY15"/>
+              </a:cxn>
+              <a:cxn ang="0">
+                <a:pos x="connsiteX16" y="connsiteY16"/>
+              </a:cxn>
+            </a:cxnLst>
+            <a:rect l="l" t="t" r="r" b="b"/>
+            <a:pathLst>
+              <a:path w="2467778" h="3106757">
+                <a:moveTo>
+                  <a:pt x="447415" y="59674"/>
+                </a:moveTo>
+                <a:cubicBezTo>
+                  <a:pt x="230230" y="59674"/>
+                  <a:pt x="54166" y="235738"/>
+                  <a:pt x="54166" y="452923"/>
+                </a:cubicBezTo>
+                <a:lnTo>
+                  <a:pt x="54166" y="2653832"/>
+                </a:lnTo>
+                <a:cubicBezTo>
+                  <a:pt x="54166" y="2871017"/>
+                  <a:pt x="230230" y="3047081"/>
+                  <a:pt x="447415" y="3047081"/>
+                </a:cubicBezTo>
+                <a:lnTo>
+                  <a:pt x="2020362" y="3047081"/>
+                </a:lnTo>
+                <a:cubicBezTo>
+                  <a:pt x="2237547" y="3047081"/>
+                  <a:pt x="2413611" y="2871017"/>
+                  <a:pt x="2413611" y="2653832"/>
+                </a:cubicBezTo>
+                <a:lnTo>
+                  <a:pt x="2413611" y="452923"/>
+                </a:lnTo>
+                <a:cubicBezTo>
+                  <a:pt x="2413611" y="235738"/>
+                  <a:pt x="2237547" y="59674"/>
+                  <a:pt x="2020362" y="59674"/>
+                </a:cubicBezTo>
+                <a:close/>
+                <a:moveTo>
+                  <a:pt x="411305" y="0"/>
+                </a:moveTo>
+                <a:lnTo>
+                  <a:pt x="2056473" y="0"/>
+                </a:lnTo>
+                <a:cubicBezTo>
+                  <a:pt x="2283630" y="0"/>
+                  <a:pt x="2467778" y="184148"/>
+                  <a:pt x="2467778" y="411305"/>
+                </a:cubicBezTo>
+                <a:lnTo>
+                  <a:pt x="2467778" y="2695452"/>
+                </a:lnTo>
+                <a:cubicBezTo>
+                  <a:pt x="2467778" y="2922609"/>
+                  <a:pt x="2283630" y="3106757"/>
+                  <a:pt x="2056473" y="3106757"/>
+                </a:cubicBezTo>
+                <a:lnTo>
+                  <a:pt x="411305" y="3106757"/>
+                </a:lnTo>
+                <a:cubicBezTo>
+                  <a:pt x="184148" y="3106757"/>
+                  <a:pt x="0" y="2922609"/>
+                  <a:pt x="0" y="2695452"/>
+                </a:cubicBezTo>
+                <a:lnTo>
+                  <a:pt x="0" y="411305"/>
+                </a:lnTo>
+                <a:cubicBezTo>
+                  <a:pt x="0" y="184148"/>
+                  <a:pt x="184148" y="0"/>
+                  <a:pt x="411305" y="0"/>
+                </a:cubicBezTo>
+                <a:close/>
+              </a:path>
+            </a:pathLst>
+          </a:custGeom>
+          <a:gradFill>
+            <a:gsLst>
+              <a:gs pos="81000">
+                <a:srgbClr val="FAEDCD"/>
+              </a:gs>
+              <a:gs pos="20000">
+                <a:srgbClr val="D4A373"/>
+              </a:gs>
+            </a:gsLst>
+            <a:lin ang="5400000" scaled="1"/>
+          </a:gradFill>
+        </p:spPr>
+        <p:style>
+          <a:lnRef idx="2">
+            <a:schemeClr val="accent1">
+              <a:shade val="50000"/>
+            </a:schemeClr>
+          </a:lnRef>
+          <a:fillRef idx="1">
+            <a:schemeClr val="accent1"/>
+          </a:fillRef>
+          <a:effectRef idx="0">
+            <a:schemeClr val="accent1"/>
+          </a:effectRef>
+          <a:fontRef idx="minor">
+            <a:schemeClr val="lt1"/>
+          </a:fontRef>
+        </p:style>
+        <p:txBody>
+          <a:bodyPr wrap="square" rtlCol="0" anchor="ctr">
+            <a:noAutofit/>
+          </a:bodyPr>
+          <a:lstStyle/>
+          <a:p>
+            <a:pPr algn="ctr"/>
+            <a:endParaRPr lang="en-NL"/>
+          </a:p>
+        </p:txBody>
+      </p:sp>
+      <p:sp>
+        <p:nvSpPr>
+          <p:cNvPr id="9" name="Rounded Rectangle 8">
+            <a:extLst>
+              <a:ext uri="{FF2B5EF4-FFF2-40B4-BE49-F238E27FC236}">
+                <a16:creationId xmlns:a16="http://schemas.microsoft.com/office/drawing/2014/main" id="{0DE20BB9-95EE-C722-DE3D-8ADFB4A238F5}"/>
+              </a:ext>
+            </a:extLst>
+          </p:cNvPr>
+          <p:cNvSpPr/>
+          <p:nvPr/>
+        </p:nvSpPr>
+        <p:spPr>
+          <a:xfrm>
+            <a:off x="726196" y="764753"/>
+            <a:ext cx="2359445" cy="2987407"/>
+          </a:xfrm>
+          <a:prstGeom prst="roundRect">
+            <a:avLst/>
+          </a:prstGeom>
+          <a:noFill/>
+        </p:spPr>
+        <p:style>
+          <a:lnRef idx="2">
+            <a:schemeClr val="accent1">
+              <a:shade val="50000"/>
+            </a:schemeClr>
+          </a:lnRef>
+          <a:fillRef idx="1">
+            <a:schemeClr val="accent1"/>
+          </a:fillRef>
+          <a:effectRef idx="0">
+            <a:schemeClr val="accent1"/>
+          </a:effectRef>
+          <a:fontRef idx="minor">
+            <a:schemeClr val="lt1"/>
+          </a:fontRef>
+        </p:style>
+        <p:txBody>
+          <a:bodyPr rtlCol="0" anchor="ctr"/>
+          <a:lstStyle/>
+          <a:p>
+            <a:pPr algn="ctr"/>
+            <a:endParaRPr lang="en-NL"/>
+          </a:p>
+        </p:txBody>
+      </p:sp>
+      <p:sp>
+        <p:nvSpPr>
+          <p:cNvPr id="11" name="TextBox 10">
+            <a:extLst>
+              <a:ext uri="{FF2B5EF4-FFF2-40B4-BE49-F238E27FC236}">
+                <a16:creationId xmlns:a16="http://schemas.microsoft.com/office/drawing/2014/main" id="{60BFEEAA-B9D6-3B01-7FB6-DB7D537D415D}"/>
+              </a:ext>
+            </a:extLst>
+          </p:cNvPr>
+          <p:cNvSpPr txBox="1"/>
+          <p:nvPr/>
+        </p:nvSpPr>
+        <p:spPr>
+          <a:xfrm>
+            <a:off x="925417" y="1024569"/>
+            <a:ext cx="1972019" cy="2862322"/>
+          </a:xfrm>
+          <a:prstGeom prst="rect">
+            <a:avLst/>
+          </a:prstGeom>
+          <a:noFill/>
+        </p:spPr>
+        <p:txBody>
+          <a:bodyPr wrap="square" rtlCol="0">
+            <a:spAutoFit/>
+          </a:bodyPr>
+          <a:lstStyle/>
+          <a:p>
+            <a:r>
+              <a:rPr lang="en-GB" dirty="0"/>
+              <a:t>L</a:t>
+            </a:r>
+            <a:r>
+              <a:rPr lang="en-NL" dirty="0"/>
+              <a:t>orem ipsum dolor</a:t>
+            </a:r>
+          </a:p>
+          <a:p>
+            <a:r>
+              <a:rPr lang="en-GB" dirty="0"/>
+              <a:t>S</a:t>
+            </a:r>
+            <a:r>
+              <a:rPr lang="en-NL" dirty="0"/>
+              <a:t>it amet capsum</a:t>
+            </a:r>
+          </a:p>
+          <a:p>
+            <a:endParaRPr lang="en-NL" dirty="0"/>
+          </a:p>
+          <a:p>
+            <a:r>
+              <a:rPr lang="en-GB" dirty="0"/>
+              <a:t>L</a:t>
+            </a:r>
+            <a:r>
+              <a:rPr lang="en-NL" dirty="0"/>
+              <a:t>orem ipsum dolor</a:t>
+            </a:r>
+          </a:p>
+          <a:p>
+            <a:r>
+              <a:rPr lang="en-GB" dirty="0"/>
+              <a:t>S</a:t>
+            </a:r>
+            <a:r>
+              <a:rPr lang="en-NL" dirty="0"/>
+              <a:t>it amet capsum</a:t>
+            </a:r>
+          </a:p>
+          <a:p>
+            <a:endParaRPr lang="en-NL" dirty="0"/>
+          </a:p>
+          <a:p>
+            <a:r>
+              <a:rPr lang="en-GB" dirty="0"/>
+              <a:t>L</a:t>
+            </a:r>
+            <a:r>
+              <a:rPr lang="en-NL" dirty="0"/>
+              <a:t>orem ipsum dolor</a:t>
+            </a:r>
+          </a:p>
+          <a:p>
+            <a:r>
+              <a:rPr lang="en-GB" dirty="0"/>
+              <a:t>S</a:t>
+            </a:r>
+            <a:r>
+              <a:rPr lang="en-NL" dirty="0"/>
+              <a:t>it amet capsum</a:t>
+            </a:r>
+          </a:p>
+          <a:p>
+            <a:endParaRPr lang="en-NL" dirty="0"/>
+          </a:p>
+          <a:p>
+            <a:endParaRPr lang="en-NL" dirty="0"/>
+          </a:p>
+        </p:txBody>
+      </p:sp>
+      <p:sp>
+        <p:nvSpPr>
+          <p:cNvPr id="12" name="Freeform 11">
+            <a:extLst>
+              <a:ext uri="{FF2B5EF4-FFF2-40B4-BE49-F238E27FC236}">
+                <a16:creationId xmlns:a16="http://schemas.microsoft.com/office/drawing/2014/main" id="{24C54D9B-733D-EE99-0071-C1C783751ACB}"/>
+              </a:ext>
+            </a:extLst>
+          </p:cNvPr>
+          <p:cNvSpPr/>
+          <p:nvPr/>
+        </p:nvSpPr>
+        <p:spPr>
+          <a:xfrm>
+            <a:off x="8998026" y="3303223"/>
+            <a:ext cx="2467778" cy="3106757"/>
+          </a:xfrm>
+          <a:custGeom>
+            <a:avLst/>
+            <a:gdLst>
+              <a:gd name="connsiteX0" fmla="*/ 447415 w 2467778"/>
+              <a:gd name="connsiteY0" fmla="*/ 59674 h 3106757"/>
+              <a:gd name="connsiteX1" fmla="*/ 54166 w 2467778"/>
+              <a:gd name="connsiteY1" fmla="*/ 452923 h 3106757"/>
+              <a:gd name="connsiteX2" fmla="*/ 54166 w 2467778"/>
+              <a:gd name="connsiteY2" fmla="*/ 2653832 h 3106757"/>
+              <a:gd name="connsiteX3" fmla="*/ 447415 w 2467778"/>
+              <a:gd name="connsiteY3" fmla="*/ 3047081 h 3106757"/>
+              <a:gd name="connsiteX4" fmla="*/ 2020362 w 2467778"/>
+              <a:gd name="connsiteY4" fmla="*/ 3047081 h 3106757"/>
+              <a:gd name="connsiteX5" fmla="*/ 2413611 w 2467778"/>
+              <a:gd name="connsiteY5" fmla="*/ 2653832 h 3106757"/>
+              <a:gd name="connsiteX6" fmla="*/ 2413611 w 2467778"/>
+              <a:gd name="connsiteY6" fmla="*/ 452923 h 3106757"/>
+              <a:gd name="connsiteX7" fmla="*/ 2020362 w 2467778"/>
+              <a:gd name="connsiteY7" fmla="*/ 59674 h 3106757"/>
+              <a:gd name="connsiteX8" fmla="*/ 411305 w 2467778"/>
+              <a:gd name="connsiteY8" fmla="*/ 0 h 3106757"/>
+              <a:gd name="connsiteX9" fmla="*/ 2056473 w 2467778"/>
+              <a:gd name="connsiteY9" fmla="*/ 0 h 3106757"/>
+              <a:gd name="connsiteX10" fmla="*/ 2467778 w 2467778"/>
+              <a:gd name="connsiteY10" fmla="*/ 411305 h 3106757"/>
+              <a:gd name="connsiteX11" fmla="*/ 2467778 w 2467778"/>
+              <a:gd name="connsiteY11" fmla="*/ 2695452 h 3106757"/>
+              <a:gd name="connsiteX12" fmla="*/ 2056473 w 2467778"/>
+              <a:gd name="connsiteY12" fmla="*/ 3106757 h 3106757"/>
+              <a:gd name="connsiteX13" fmla="*/ 411305 w 2467778"/>
+              <a:gd name="connsiteY13" fmla="*/ 3106757 h 3106757"/>
+              <a:gd name="connsiteX14" fmla="*/ 0 w 2467778"/>
+              <a:gd name="connsiteY14" fmla="*/ 2695452 h 3106757"/>
+              <a:gd name="connsiteX15" fmla="*/ 0 w 2467778"/>
+              <a:gd name="connsiteY15" fmla="*/ 411305 h 3106757"/>
+              <a:gd name="connsiteX16" fmla="*/ 411305 w 2467778"/>
+              <a:gd name="connsiteY16" fmla="*/ 0 h 3106757"/>
+            </a:gdLst>
+            <a:ahLst/>
+            <a:cxnLst>
+              <a:cxn ang="0">
+                <a:pos x="connsiteX0" y="connsiteY0"/>
+              </a:cxn>
+              <a:cxn ang="0">
+                <a:pos x="connsiteX1" y="connsiteY1"/>
+              </a:cxn>
+              <a:cxn ang="0">
+                <a:pos x="connsiteX2" y="connsiteY2"/>
+              </a:cxn>
+              <a:cxn ang="0">
+                <a:pos x="connsiteX3" y="connsiteY3"/>
+              </a:cxn>
+              <a:cxn ang="0">
+                <a:pos x="connsiteX4" y="connsiteY4"/>
+              </a:cxn>
+              <a:cxn ang="0">
+                <a:pos x="connsiteX5" y="connsiteY5"/>
+              </a:cxn>
+              <a:cxn ang="0">
+                <a:pos x="connsiteX6" y="connsiteY6"/>
+              </a:cxn>
+              <a:cxn ang="0">
+                <a:pos x="connsiteX7" y="connsiteY7"/>
+              </a:cxn>
+              <a:cxn ang="0">
+                <a:pos x="connsiteX8" y="connsiteY8"/>
+              </a:cxn>
+              <a:cxn ang="0">
+                <a:pos x="connsiteX9" y="connsiteY9"/>
+              </a:cxn>
+              <a:cxn ang="0">
+                <a:pos x="connsiteX10" y="connsiteY10"/>
+              </a:cxn>
+              <a:cxn ang="0">
+                <a:pos x="connsiteX11" y="connsiteY11"/>
+              </a:cxn>
+              <a:cxn ang="0">
+                <a:pos x="connsiteX12" y="connsiteY12"/>
+              </a:cxn>
+              <a:cxn ang="0">
+                <a:pos x="connsiteX13" y="connsiteY13"/>
+              </a:cxn>
+              <a:cxn ang="0">
+                <a:pos x="connsiteX14" y="connsiteY14"/>
+              </a:cxn>
+              <a:cxn ang="0">
+                <a:pos x="connsiteX15" y="connsiteY15"/>
+              </a:cxn>
+              <a:cxn ang="0">
+                <a:pos x="connsiteX16" y="connsiteY16"/>
+              </a:cxn>
+            </a:cxnLst>
+            <a:rect l="l" t="t" r="r" b="b"/>
+            <a:pathLst>
+              <a:path w="2467778" h="3106757">
+                <a:moveTo>
+                  <a:pt x="447415" y="59674"/>
+                </a:moveTo>
+                <a:cubicBezTo>
+                  <a:pt x="230230" y="59674"/>
+                  <a:pt x="54166" y="235738"/>
+                  <a:pt x="54166" y="452923"/>
+                </a:cubicBezTo>
+                <a:lnTo>
+                  <a:pt x="54166" y="2653832"/>
+                </a:lnTo>
+                <a:cubicBezTo>
+                  <a:pt x="54166" y="2871017"/>
+                  <a:pt x="230230" y="3047081"/>
+                  <a:pt x="447415" y="3047081"/>
+                </a:cubicBezTo>
+                <a:lnTo>
+                  <a:pt x="2020362" y="3047081"/>
+                </a:lnTo>
+                <a:cubicBezTo>
+                  <a:pt x="2237547" y="3047081"/>
+                  <a:pt x="2413611" y="2871017"/>
+                  <a:pt x="2413611" y="2653832"/>
+                </a:cubicBezTo>
+                <a:lnTo>
+                  <a:pt x="2413611" y="452923"/>
+                </a:lnTo>
+                <a:cubicBezTo>
+                  <a:pt x="2413611" y="235738"/>
+                  <a:pt x="2237547" y="59674"/>
+                  <a:pt x="2020362" y="59674"/>
+                </a:cubicBezTo>
+                <a:close/>
+                <a:moveTo>
+                  <a:pt x="411305" y="0"/>
+                </a:moveTo>
+                <a:lnTo>
+                  <a:pt x="2056473" y="0"/>
+                </a:lnTo>
+                <a:cubicBezTo>
+                  <a:pt x="2283630" y="0"/>
+                  <a:pt x="2467778" y="184148"/>
+                  <a:pt x="2467778" y="411305"/>
+                </a:cubicBezTo>
+                <a:lnTo>
+                  <a:pt x="2467778" y="2695452"/>
+                </a:lnTo>
+                <a:cubicBezTo>
+                  <a:pt x="2467778" y="2922609"/>
+                  <a:pt x="2283630" y="3106757"/>
+                  <a:pt x="2056473" y="3106757"/>
+                </a:cubicBezTo>
+                <a:lnTo>
+                  <a:pt x="411305" y="3106757"/>
+                </a:lnTo>
+                <a:cubicBezTo>
+                  <a:pt x="184148" y="3106757"/>
+                  <a:pt x="0" y="2922609"/>
+                  <a:pt x="0" y="2695452"/>
+                </a:cubicBezTo>
+                <a:lnTo>
+                  <a:pt x="0" y="411305"/>
+                </a:lnTo>
+                <a:cubicBezTo>
+                  <a:pt x="0" y="184148"/>
+                  <a:pt x="184148" y="0"/>
+                  <a:pt x="411305" y="0"/>
+                </a:cubicBezTo>
+                <a:close/>
+              </a:path>
+            </a:pathLst>
+          </a:custGeom>
+          <a:gradFill>
+            <a:gsLst>
+              <a:gs pos="81000">
+                <a:srgbClr val="FAEDCD"/>
+              </a:gs>
+              <a:gs pos="20000">
+                <a:srgbClr val="D4A373"/>
+              </a:gs>
+            </a:gsLst>
+            <a:lin ang="5400000" scaled="1"/>
+          </a:gradFill>
+        </p:spPr>
+        <p:style>
+          <a:lnRef idx="2">
+            <a:schemeClr val="accent1">
+              <a:shade val="50000"/>
+            </a:schemeClr>
+          </a:lnRef>
+          <a:fillRef idx="1">
+            <a:schemeClr val="accent1"/>
+          </a:fillRef>
+          <a:effectRef idx="0">
+            <a:schemeClr val="accent1"/>
+          </a:effectRef>
+          <a:fontRef idx="minor">
+            <a:schemeClr val="lt1"/>
+          </a:fontRef>
+        </p:style>
+        <p:txBody>
+          <a:bodyPr wrap="square" rtlCol="0" anchor="ctr">
+            <a:noAutofit/>
+          </a:bodyPr>
+          <a:lstStyle/>
+          <a:p>
+            <a:pPr algn="ctr"/>
+            <a:endParaRPr lang="en-NL"/>
+          </a:p>
+        </p:txBody>
+      </p:sp>
+      <p:sp>
+        <p:nvSpPr>
+          <p:cNvPr id="13" name="Rounded Rectangle 12">
+            <a:extLst>
+              <a:ext uri="{FF2B5EF4-FFF2-40B4-BE49-F238E27FC236}">
+                <a16:creationId xmlns:a16="http://schemas.microsoft.com/office/drawing/2014/main" id="{F8F5793D-503F-25DF-5E1D-31904B3FCFF2}"/>
+              </a:ext>
+            </a:extLst>
+          </p:cNvPr>
+          <p:cNvSpPr/>
+          <p:nvPr/>
+        </p:nvSpPr>
+        <p:spPr>
+          <a:xfrm>
+            <a:off x="9052192" y="3362897"/>
+            <a:ext cx="2359445" cy="2987407"/>
+          </a:xfrm>
+          <a:prstGeom prst="roundRect">
+            <a:avLst/>
+          </a:prstGeom>
+          <a:noFill/>
+        </p:spPr>
+        <p:style>
+          <a:lnRef idx="2">
+            <a:schemeClr val="accent1">
+              <a:shade val="50000"/>
+            </a:schemeClr>
+          </a:lnRef>
+          <a:fillRef idx="1">
+            <a:schemeClr val="accent1"/>
+          </a:fillRef>
+          <a:effectRef idx="0">
+            <a:schemeClr val="accent1"/>
+          </a:effectRef>
+          <a:fontRef idx="minor">
+            <a:schemeClr val="lt1"/>
+          </a:fontRef>
+        </p:style>
+        <p:txBody>
+          <a:bodyPr rtlCol="0" anchor="ctr"/>
+          <a:lstStyle/>
+          <a:p>
+            <a:pPr algn="ctr"/>
+            <a:endParaRPr lang="en-NL"/>
+          </a:p>
+        </p:txBody>
+      </p:sp>
+      <p:sp>
+        <p:nvSpPr>
+          <p:cNvPr id="14" name="TextBox 13">
+            <a:extLst>
+              <a:ext uri="{FF2B5EF4-FFF2-40B4-BE49-F238E27FC236}">
+                <a16:creationId xmlns:a16="http://schemas.microsoft.com/office/drawing/2014/main" id="{B5FDDE42-AAA3-19D7-0236-483E9E7CC99F}"/>
+              </a:ext>
+            </a:extLst>
+          </p:cNvPr>
+          <p:cNvSpPr txBox="1"/>
+          <p:nvPr/>
+        </p:nvSpPr>
+        <p:spPr>
+          <a:xfrm>
+            <a:off x="9251413" y="3622713"/>
+            <a:ext cx="1972019" cy="2862322"/>
+          </a:xfrm>
+          <a:prstGeom prst="rect">
+            <a:avLst/>
+          </a:prstGeom>
+          <a:noFill/>
+        </p:spPr>
+        <p:txBody>
+          <a:bodyPr wrap="square" rtlCol="0">
+            <a:spAutoFit/>
+          </a:bodyPr>
+          <a:lstStyle/>
+          <a:p>
+            <a:r>
+              <a:rPr lang="en-GB" dirty="0"/>
+              <a:t>L</a:t>
+            </a:r>
+            <a:r>
+              <a:rPr lang="en-NL" dirty="0"/>
+              <a:t>orem ipsum dolor</a:t>
+            </a:r>
+          </a:p>
+          <a:p>
+            <a:r>
+              <a:rPr lang="en-GB" dirty="0"/>
+              <a:t>S</a:t>
+            </a:r>
+            <a:r>
+              <a:rPr lang="en-NL" dirty="0"/>
+              <a:t>it amet capsum</a:t>
+            </a:r>
+          </a:p>
+          <a:p>
+            <a:endParaRPr lang="en-NL" dirty="0"/>
+          </a:p>
+          <a:p>
+            <a:r>
+              <a:rPr lang="en-GB" dirty="0"/>
+              <a:t>L</a:t>
+            </a:r>
+            <a:r>
+              <a:rPr lang="en-NL" dirty="0"/>
+              <a:t>orem ipsum dolor</a:t>
+            </a:r>
+          </a:p>
+          <a:p>
+            <a:r>
+              <a:rPr lang="en-GB" dirty="0"/>
+              <a:t>S</a:t>
+            </a:r>
+            <a:r>
+              <a:rPr lang="en-NL" dirty="0"/>
+              <a:t>it amet capsum</a:t>
+            </a:r>
+          </a:p>
+          <a:p>
+            <a:endParaRPr lang="en-NL" dirty="0"/>
+          </a:p>
+          <a:p>
+            <a:r>
+              <a:rPr lang="en-GB" dirty="0"/>
+              <a:t>L</a:t>
+            </a:r>
+            <a:r>
+              <a:rPr lang="en-NL" dirty="0"/>
+              <a:t>orem ipsum dolor</a:t>
+            </a:r>
+          </a:p>
+          <a:p>
+            <a:r>
+              <a:rPr lang="en-GB" dirty="0"/>
+              <a:t>S</a:t>
+            </a:r>
+            <a:r>
+              <a:rPr lang="en-NL" dirty="0"/>
+              <a:t>it amet capsum</a:t>
+            </a:r>
+          </a:p>
+          <a:p>
+            <a:endParaRPr lang="en-NL" dirty="0"/>
+          </a:p>
+          <a:p>
+            <a:endParaRPr lang="en-NL" dirty="0"/>
+          </a:p>
+        </p:txBody>
+      </p:sp>
+    </p:spTree>
+    <p:extLst>
+      <p:ext uri="{BB962C8B-B14F-4D97-AF65-F5344CB8AC3E}">
+        <p14:creationId xmlns:p14="http://schemas.microsoft.com/office/powerpoint/2010/main" val="2907165968"/>
+      </p:ext>
+    </p:extLst>
+  </p:cSld>
+  <p:clrMapOvr>
+    <a:masterClrMapping/>
+  </p:clrMapOvr>
+  <p:timing>
+    <p:tnLst>
+      <p:par>
+        <p:cTn id="1" dur="indefinite" restart="never" nodeType="tmRoot">
+          <p:childTnLst>
+            <p:seq concurrent="1" nextAc="seek">
+              <p:cTn id="2" dur="indefinite" nodeType="mainSeq">
+                <p:childTnLst>
+                  <p:par>
+                    <p:cTn id="3" fill="hold">
+                      <p:stCondLst>
+                        <p:cond delay="indefinite"/>
+                        <p:cond evt="onBegin" delay="0">
+                          <p:tn val="2"/>
+                        </p:cond>
+                      </p:stCondLst>
+                      <p:childTnLst>
+                        <p:par>
+                          <p:cTn id="4" fill="hold">
+                            <p:stCondLst>
+                              <p:cond delay="0"/>
+                            </p:stCondLst>
+                            <p:childTnLst>
+                              <p:par>
+                                <p:cTn id="5" presetID="27" presetClass="emph" presetSubtype="0" repeatCount="indefinite" fill="remove" grpId="0" nodeType="withEffect">
+                                  <p:stCondLst>
+                                    <p:cond delay="0"/>
+                                  </p:stCondLst>
+                                  <p:childTnLst>
+                                    <p:animClr clrSpc="rgb" dir="cw">
+                                      <p:cBhvr override="childStyle">
+                                        <p:cTn id="6" dur="1500" autoRev="1" fill="remove"/>
+                                        <p:tgtEl>
+                                          <p:spTgt spid="12"/>
+                                        </p:tgtEl>
+                                        <p:attrNameLst>
+                                          <p:attrName>style.color</p:attrName>
+                                        </p:attrNameLst>
+                                      </p:cBhvr>
+                                      <p:to>
+                                        <a:schemeClr val="bg1"/>
+                                      </p:to>
+                                    </p:animClr>
+                                    <p:animClr clrSpc="rgb" dir="cw">
+                                      <p:cBhvr>
+                                        <p:cTn id="7" dur="1500" autoRev="1" fill="remove"/>
+                                        <p:tgtEl>
+                                          <p:spTgt spid="12"/>
+                                        </p:tgtEl>
+                                        <p:attrNameLst>
+                                          <p:attrName>fillcolor</p:attrName>
+                                        </p:attrNameLst>
+                                      </p:cBhvr>
+                                      <p:to>
+                                        <a:schemeClr val="bg1"/>
+                                      </p:to>
+                                    </p:animClr>
+                                    <p:set>
+                                      <p:cBhvr>
+                                        <p:cTn id="8" dur="1500" autoRev="1" fill="remove"/>
+                                        <p:tgtEl>
+                                          <p:spTgt spid="12"/>
+                                        </p:tgtEl>
+                                        <p:attrNameLst>
+                                          <p:attrName>fill.type</p:attrName>
+                                        </p:attrNameLst>
+                                      </p:cBhvr>
+                                      <p:to>
+                                        <p:strVal val="solid"/>
+                                      </p:to>
+                                    </p:set>
+                                    <p:set>
+                                      <p:cBhvr>
+                                        <p:cTn id="9" dur="1500" autoRev="1" fill="remove"/>
+                                        <p:tgtEl>
+                                          <p:spTgt spid="12"/>
+                                        </p:tgtEl>
+                                        <p:attrNameLst>
+                                          <p:attrName>fill.on</p:attrName>
+                                        </p:attrNameLst>
+                                      </p:cBhvr>
+                                      <p:to>
+                                        <p:strVal val="true"/>
+                                      </p:to>
+                                    </p:set>
+                                  </p:childTnLst>
+                                </p:cTn>
+                              </p:par>
+                              <p:par>
+                                <p:cTn id="10" presetID="27" presetClass="emph" presetSubtype="0" repeatCount="indefinite" fill="remove" grpId="0" nodeType="withEffect">
+                                  <p:stCondLst>
+                                    <p:cond delay="0"/>
+                                  </p:stCondLst>
+                                  <p:childTnLst>
+                                    <p:animClr clrSpc="rgb" dir="cw">
+                                      <p:cBhvr override="childStyle">
+                                        <p:cTn id="11" dur="1500" autoRev="1" fill="remove"/>
+                                        <p:tgtEl>
+                                          <p:spTgt spid="8"/>
+                                        </p:tgtEl>
+                                        <p:attrNameLst>
+                                          <p:attrName>style.color</p:attrName>
+                                        </p:attrNameLst>
+                                      </p:cBhvr>
+                                      <p:to>
+                                        <a:schemeClr val="bg1"/>
+                                      </p:to>
+                                    </p:animClr>
+                                    <p:animClr clrSpc="rgb" dir="cw">
+                                      <p:cBhvr>
+                                        <p:cTn id="12" dur="1500" autoRev="1" fill="remove"/>
+                                        <p:tgtEl>
+                                          <p:spTgt spid="8"/>
+                                        </p:tgtEl>
+                                        <p:attrNameLst>
+                                          <p:attrName>fillcolor</p:attrName>
+                                        </p:attrNameLst>
+                                      </p:cBhvr>
+                                      <p:to>
+                                        <a:schemeClr val="bg1"/>
+                                      </p:to>
+                                    </p:animClr>
+                                    <p:set>
+                                      <p:cBhvr>
+                                        <p:cTn id="13" dur="1500" autoRev="1" fill="remove"/>
+                                        <p:tgtEl>
+                                          <p:spTgt spid="8"/>
+                                        </p:tgtEl>
+                                        <p:attrNameLst>
+                                          <p:attrName>fill.type</p:attrName>
+                                        </p:attrNameLst>
+                                      </p:cBhvr>
+                                      <p:to>
+                                        <p:strVal val="solid"/>
+                                      </p:to>
+                                    </p:set>
+                                    <p:set>
+                                      <p:cBhvr>
+                                        <p:cTn id="14" dur="1500" autoRev="1" fill="remove"/>
+                                        <p:tgtEl>
+                                          <p:spTgt spid="8"/>
+                                        </p:tgtEl>
+                                        <p:attrNameLst>
+                                          <p:attrName>fill.on</p:attrName>
+                                        </p:attrNameLst>
+                                      </p:cBhvr>
+                                      <p:to>
+                                        <p:strVal val="true"/>
+                                      </p:to>
+                                    </p:set>
+                                  </p:childTnLst>
+                                </p:cTn>
+                              </p:par>
+                            </p:childTnLst>
+                          </p:cTn>
+                        </p:par>
+                      </p:childTnLst>
+                    </p:cTn>
+                  </p:par>
+                </p:childTnLst>
+              </p:cTn>
+              <p:prevCondLst>
+                <p:cond evt="onPrev" delay="0">
+                  <p:tgtEl>
+                    <p:sldTgt/>
+                  </p:tgtEl>
+                </p:cond>
+              </p:prevCondLst>
+              <p:nextCondLst>
+                <p:cond evt="onNext" delay="0">
+                  <p:tgtEl>
+                    <p:sldTgt/>
+                  </p:tgtEl>
+                </p:cond>
+              </p:nextCondLst>
+            </p:seq>
+          </p:childTnLst>
+        </p:cTn>
+      </p:par>
+    </p:tnLst>
+    <p:bldLst>
+      <p:bldP spid="8" grpId="0" animBg="1"/>
       <p:bldP spid="12" grpId="0" animBg="1"/>
     </p:bldLst>
   </p:timing>

</xml_diff>